<commit_message>
added session 4 slides content
</commit_message>
<xml_diff>
--- a/setup-guide/Hands-on Pact.pptx
+++ b/setup-guide/Hands-on Pact.pptx
@@ -10244,7 +10244,7 @@
           <a:p>
             <a:fld id="{CFA7EAFB-8655-4DEA-B26A-4F9D15C31331}" type="datetimeFigureOut">
               <a:rPr lang="en-US" smtClean="0"/>
-              <a:t>9/21/2023</a:t>
+              <a:t>9/22/2023</a:t>
             </a:fld>
             <a:endParaRPr lang="en-US"/>
           </a:p>
@@ -10742,7 +10742,7 @@
           <a:p>
             <a:fld id="{098E7344-A9C5-48D3-AF8E-FD54B3B42FB9}" type="datetimeFigureOut">
               <a:rPr lang="en-US" smtClean="0"/>
-              <a:t>9/21/2023</a:t>
+              <a:t>9/22/2023</a:t>
             </a:fld>
             <a:endParaRPr lang="en-US"/>
           </a:p>
@@ -10940,7 +10940,7 @@
           <a:p>
             <a:fld id="{098E7344-A9C5-48D3-AF8E-FD54B3B42FB9}" type="datetimeFigureOut">
               <a:rPr lang="en-US" smtClean="0"/>
-              <a:t>9/21/2023</a:t>
+              <a:t>9/22/2023</a:t>
             </a:fld>
             <a:endParaRPr lang="en-US"/>
           </a:p>
@@ -11148,7 +11148,7 @@
           <a:p>
             <a:fld id="{098E7344-A9C5-48D3-AF8E-FD54B3B42FB9}" type="datetimeFigureOut">
               <a:rPr lang="en-US" smtClean="0"/>
-              <a:t>9/21/2023</a:t>
+              <a:t>9/22/2023</a:t>
             </a:fld>
             <a:endParaRPr lang="en-US"/>
           </a:p>
@@ -11346,7 +11346,7 @@
           <a:p>
             <a:fld id="{098E7344-A9C5-48D3-AF8E-FD54B3B42FB9}" type="datetimeFigureOut">
               <a:rPr lang="en-US" smtClean="0"/>
-              <a:t>9/21/2023</a:t>
+              <a:t>9/22/2023</a:t>
             </a:fld>
             <a:endParaRPr lang="en-US"/>
           </a:p>
@@ -11621,7 +11621,7 @@
           <a:p>
             <a:fld id="{098E7344-A9C5-48D3-AF8E-FD54B3B42FB9}" type="datetimeFigureOut">
               <a:rPr lang="en-US" smtClean="0"/>
-              <a:t>9/21/2023</a:t>
+              <a:t>9/22/2023</a:t>
             </a:fld>
             <a:endParaRPr lang="en-US"/>
           </a:p>
@@ -11886,7 +11886,7 @@
           <a:p>
             <a:fld id="{098E7344-A9C5-48D3-AF8E-FD54B3B42FB9}" type="datetimeFigureOut">
               <a:rPr lang="en-US" smtClean="0"/>
-              <a:t>9/21/2023</a:t>
+              <a:t>9/22/2023</a:t>
             </a:fld>
             <a:endParaRPr lang="en-US"/>
           </a:p>
@@ -12298,7 +12298,7 @@
           <a:p>
             <a:fld id="{098E7344-A9C5-48D3-AF8E-FD54B3B42FB9}" type="datetimeFigureOut">
               <a:rPr lang="en-US" smtClean="0"/>
-              <a:t>9/21/2023</a:t>
+              <a:t>9/22/2023</a:t>
             </a:fld>
             <a:endParaRPr lang="en-US"/>
           </a:p>
@@ -12439,7 +12439,7 @@
           <a:p>
             <a:fld id="{098E7344-A9C5-48D3-AF8E-FD54B3B42FB9}" type="datetimeFigureOut">
               <a:rPr lang="en-US" smtClean="0"/>
-              <a:t>9/21/2023</a:t>
+              <a:t>9/22/2023</a:t>
             </a:fld>
             <a:endParaRPr lang="en-US"/>
           </a:p>
@@ -12552,7 +12552,7 @@
           <a:p>
             <a:fld id="{098E7344-A9C5-48D3-AF8E-FD54B3B42FB9}" type="datetimeFigureOut">
               <a:rPr lang="en-US" smtClean="0"/>
-              <a:t>9/21/2023</a:t>
+              <a:t>9/22/2023</a:t>
             </a:fld>
             <a:endParaRPr lang="en-US"/>
           </a:p>
@@ -12863,7 +12863,7 @@
           <a:p>
             <a:fld id="{098E7344-A9C5-48D3-AF8E-FD54B3B42FB9}" type="datetimeFigureOut">
               <a:rPr lang="en-US" smtClean="0"/>
-              <a:t>9/21/2023</a:t>
+              <a:t>9/22/2023</a:t>
             </a:fld>
             <a:endParaRPr lang="en-US"/>
           </a:p>
@@ -13151,7 +13151,7 @@
           <a:p>
             <a:fld id="{098E7344-A9C5-48D3-AF8E-FD54B3B42FB9}" type="datetimeFigureOut">
               <a:rPr lang="en-US" smtClean="0"/>
-              <a:t>9/21/2023</a:t>
+              <a:t>9/22/2023</a:t>
             </a:fld>
             <a:endParaRPr lang="en-US"/>
           </a:p>
@@ -13392,7 +13392,7 @@
           <a:p>
             <a:fld id="{098E7344-A9C5-48D3-AF8E-FD54B3B42FB9}" type="datetimeFigureOut">
               <a:rPr lang="en-US" smtClean="0"/>
-              <a:t>9/21/2023</a:t>
+              <a:t>9/22/2023</a:t>
             </a:fld>
             <a:endParaRPr lang="en-US"/>
           </a:p>
@@ -27788,28 +27788,67 @@
         </p:nvSpPr>
         <p:spPr>
           <a:xfrm>
-            <a:off x="4866559" y="808893"/>
-            <a:ext cx="7222161" cy="5867502"/>
+            <a:off x="4880099" y="125971"/>
+            <a:ext cx="7222161" cy="6606057"/>
           </a:xfrm>
         </p:spPr>
         <p:txBody>
           <a:bodyPr anchor="ctr">
-            <a:normAutofit/>
+            <a:noAutofit/>
           </a:bodyPr>
           <a:lstStyle/>
           <a:p>
             <a:pPr marL="0" indent="0">
               <a:buNone/>
             </a:pPr>
-            <a:endParaRPr lang="en-US" sz="1600" dirty="0"/>
+            <a:endParaRPr lang="en-US" sz="1400" dirty="0"/>
           </a:p>
           <a:p>
             <a:pPr marL="342900" indent="-342900">
               <a:buAutoNum type="arabicPeriod"/>
             </a:pPr>
             <a:r>
-              <a:rPr lang="en-US" sz="1600" dirty="0"/>
+              <a:rPr lang="en-US" sz="1400" dirty="0"/>
               <a:t>Add pact provider dependency</a:t>
+            </a:r>
+          </a:p>
+          <a:p>
+            <a:pPr marL="342900" indent="-342900">
+              <a:buAutoNum type="arabicPeriod"/>
+            </a:pPr>
+            <a:r>
+              <a:rPr lang="en-US" sz="1400" dirty="0"/>
+              <a:t>Specify provider name &amp; contract file location to the provider test class</a:t>
+            </a:r>
+          </a:p>
+          <a:p>
+            <a:pPr lvl="1"/>
+            <a:r>
+              <a:rPr lang="en-US" sz="1200" b="1" dirty="0"/>
+              <a:t>@Provider(“</a:t>
+            </a:r>
+            <a:r>
+              <a:rPr lang="en-US" sz="1200" i="1" dirty="0"/>
+              <a:t>provider-name</a:t>
+            </a:r>
+            <a:r>
+              <a:rPr lang="en-US" sz="1200" b="1" dirty="0"/>
+              <a:t>")</a:t>
+            </a:r>
+          </a:p>
+          <a:p>
+            <a:pPr lvl="1"/>
+            <a:r>
+              <a:rPr lang="en-US" sz="1200" b="1" dirty="0"/>
+              <a:t>@PactFolder(“</a:t>
+            </a:r>
+            <a:r>
+              <a:rPr lang="en-US" sz="1200" i="1" dirty="0"/>
+              <a:t>contract-file-path</a:t>
+            </a:r>
+            <a:r>
+              <a:rPr lang="en-US" sz="1200" b="1" dirty="0"/>
+              <a:t>")</a:t>
             </a:r>
           </a:p>
           <a:p>
@@ -27818,120 +27857,184 @@
               <a:buAutoNum type="arabicPeriod"/>
             </a:pPr>
             <a:r>
-              <a:rPr lang="en-US" sz="1600" dirty="0"/>
-              <a:t>Add the Pact consumer test extension to the test class.</a:t>
+              <a:rPr lang="en-US" sz="1400" dirty="0"/>
+              <a:t>Add </a:t>
+            </a:r>
+            <a:r>
+              <a:rPr lang="en-US" sz="1400" b="1" dirty="0" err="1"/>
+              <a:t>pactVerifcationTest</a:t>
+            </a:r>
+            <a:r>
+              <a:rPr lang="en-US" sz="1400" dirty="0"/>
+              <a:t> method for validating each interaction</a:t>
+            </a:r>
+          </a:p>
+          <a:p>
+            <a:pPr lvl="1"/>
+            <a:r>
+              <a:rPr lang="en-US" sz="1200" b="1" dirty="0"/>
+              <a:t>@TestTemplate (</a:t>
+            </a:r>
+            <a:r>
+              <a:rPr lang="en-US" sz="1200" i="1" dirty="0"/>
+              <a:t>just like a Data provider</a:t>
+            </a:r>
+            <a:r>
+              <a:rPr lang="en-US" sz="1200" b="1" dirty="0"/>
+              <a:t>)</a:t>
+            </a:r>
+          </a:p>
+          <a:p>
+            <a:pPr lvl="1"/>
+            <a:r>
+              <a:rPr lang="en-US" sz="1200" b="1" dirty="0" err="1"/>
+              <a:t>PactVerificationInvocationContextProvider.class</a:t>
+            </a:r>
+            <a:endParaRPr lang="en-US" sz="1200" b="1" dirty="0"/>
+          </a:p>
+          <a:p>
+            <a:pPr lvl="1"/>
+            <a:r>
+              <a:rPr lang="en-US" sz="1200" b="1" dirty="0" err="1"/>
+              <a:t>PactVerificationContext</a:t>
+            </a:r>
+            <a:endParaRPr lang="en-US" sz="1200" b="1" dirty="0"/>
+          </a:p>
+          <a:p>
+            <a:pPr lvl="1"/>
+            <a:r>
+              <a:rPr lang="en-US" sz="1200" b="1" dirty="0" err="1"/>
+              <a:t>context.verifyInteraction</a:t>
+            </a:r>
+            <a:r>
+              <a:rPr lang="en-US" sz="1200" b="1" dirty="0"/>
+              <a:t>()</a:t>
             </a:r>
           </a:p>
           <a:p>
             <a:pPr marL="342900" indent="-342900">
+              <a:buFont typeface="+mj-lt"/>
               <a:buAutoNum type="arabicPeriod"/>
             </a:pPr>
             <a:r>
-              <a:rPr lang="en-US" sz="1600" dirty="0"/>
-              <a:t>Create a method annotated with </a:t>
-            </a:r>
-            <a:r>
-              <a:rPr lang="en-US" sz="1600" b="1" dirty="0"/>
-              <a:t>@Pact </a:t>
-            </a:r>
-            <a:r>
-              <a:rPr lang="en-US" sz="1600" dirty="0"/>
-              <a:t>that returns the interactions for the test.</a:t>
-            </a:r>
+              <a:rPr lang="en-US" sz="1400" dirty="0"/>
+              <a:t>Test Target Configuration</a:t>
+            </a:r>
+          </a:p>
+          <a:p>
+            <a:pPr lvl="1"/>
+            <a:r>
+              <a:rPr lang="en-US" sz="1200" b="1" dirty="0"/>
+              <a:t>@SpringBootTest(webEnvironment = </a:t>
+            </a:r>
+            <a:r>
+              <a:rPr lang="en-US" sz="1200" b="1" dirty="0" err="1"/>
+              <a:t>SpringBootTest.WebEnvironment.RANDOM_PORT</a:t>
+            </a:r>
+            <a:r>
+              <a:rPr lang="en-US" sz="1200" b="1" dirty="0"/>
+              <a:t>)</a:t>
+            </a:r>
+            <a:endParaRPr lang="en-US" sz="1400" b="1" dirty="0"/>
+          </a:p>
+          <a:p>
+            <a:pPr lvl="1"/>
+            <a:r>
+              <a:rPr lang="en-US" sz="1200" b="1" dirty="0"/>
+              <a:t>@LocalServerPort</a:t>
+            </a:r>
+          </a:p>
+          <a:p>
+            <a:pPr lvl="1"/>
+            <a:r>
+              <a:rPr lang="en-US" sz="1200" dirty="0"/>
+              <a:t>Set test target for the context</a:t>
+            </a:r>
+            <a:endParaRPr lang="en-US" sz="1400" dirty="0"/>
           </a:p>
           <a:p>
             <a:pPr marL="342900" indent="-342900">
+              <a:buFont typeface="+mj-lt"/>
               <a:buAutoNum type="arabicPeriod"/>
             </a:pPr>
             <a:r>
-              <a:rPr lang="en-US" sz="1600" dirty="0"/>
-              <a:t>Link the mock server with the interactions for the test with </a:t>
-            </a:r>
-            <a:r>
-              <a:rPr lang="en-US" sz="1600" b="1" dirty="0"/>
-              <a:t>@PactTestFor.</a:t>
-            </a:r>
-          </a:p>
-          <a:p>
-            <a:pPr marL="342900" indent="-342900">
-              <a:buAutoNum type="arabicPeriod"/>
-            </a:pPr>
-            <a:r>
-              <a:rPr lang="en-US" sz="1600" dirty="0"/>
-              <a:t>Injecting the mock server into the test</a:t>
+              <a:rPr lang="en-US" sz="1400" dirty="0"/>
+              <a:t>Provider state</a:t>
+            </a:r>
+          </a:p>
+          <a:p>
+            <a:pPr lvl="1"/>
+            <a:r>
+              <a:rPr lang="en-US" sz="1200" dirty="0"/>
+              <a:t>Setup state</a:t>
+            </a:r>
+          </a:p>
+          <a:p>
+            <a:pPr lvl="1"/>
+            <a:r>
+              <a:rPr lang="en-US" sz="1200" dirty="0"/>
+              <a:t>Teardown state</a:t>
             </a:r>
           </a:p>
           <a:p>
             <a:pPr marL="0" indent="0">
               <a:buNone/>
             </a:pPr>
-            <a:endParaRPr lang="en-US" sz="1600" dirty="0"/>
+            <a:r>
+              <a:rPr lang="en-US" sz="1400" b="1" dirty="0"/>
+              <a:t>REFRENCE:</a:t>
+            </a:r>
+          </a:p>
+          <a:p>
+            <a:r>
+              <a:rPr lang="en-US" sz="1400" b="1" dirty="0">
+                <a:hlinkClick r:id="rId2"/>
+              </a:rPr>
+              <a:t>https://docs.pact.io/implementation_guides/jvm/provider/junit5spring</a:t>
+            </a:r>
+            <a:endParaRPr lang="en-US" sz="1400" b="1" dirty="0"/>
+          </a:p>
+          <a:p>
+            <a:r>
+              <a:rPr lang="en-US" sz="1400" b="1" dirty="0">
+                <a:hlinkClick r:id="rId3"/>
+              </a:rPr>
+              <a:t>How pact contract testing works?</a:t>
+            </a:r>
+            <a:endParaRPr lang="en-US" sz="1400" b="1" dirty="0"/>
           </a:p>
           <a:p>
             <a:pPr marL="0" indent="0">
               <a:buNone/>
             </a:pPr>
             <a:r>
-              <a:rPr lang="en-US" sz="1600" b="1" dirty="0"/>
-              <a:t>REFRENCE:</a:t>
-            </a:r>
-          </a:p>
-          <a:p>
-            <a:r>
-              <a:rPr lang="en-US" sz="1600" b="1" dirty="0">
-                <a:hlinkClick r:id="rId2"/>
-              </a:rPr>
-              <a:t>https://docs.pact.io/implementation_guides/jvm/provider/junit5spring</a:t>
-            </a:r>
-            <a:endParaRPr lang="en-US" sz="1600" b="1" dirty="0"/>
-          </a:p>
-          <a:p>
-            <a:r>
-              <a:rPr lang="en-US" sz="1600" b="1" dirty="0">
-                <a:hlinkClick r:id="rId3"/>
-              </a:rPr>
-              <a:t>How pact contract testing works?</a:t>
-            </a:r>
-            <a:endParaRPr lang="en-US" sz="1600" b="1" dirty="0"/>
+              <a:rPr lang="en-US" sz="1400" b="1" dirty="0"/>
+              <a:t>IMPORTANT NOTE</a:t>
+            </a:r>
           </a:p>
           <a:p>
             <a:pPr marL="0" indent="0">
               <a:buNone/>
             </a:pPr>
-            <a:endParaRPr lang="en-US" sz="1600" b="1" dirty="0"/>
+            <a:r>
+              <a:rPr lang="en-US" sz="1400" dirty="0"/>
+              <a:t>To know the supported JDK and Pact Specification version, refer the official GitHub project:</a:t>
+            </a:r>
+          </a:p>
+          <a:p>
+            <a:r>
+              <a:rPr lang="en-US" sz="1400" b="1" dirty="0">
+                <a:hlinkClick r:id="rId4"/>
+              </a:rPr>
+              <a:t>https://github.com/pact-foundation/pact-jvm</a:t>
+            </a:r>
+            <a:endParaRPr lang="en-US" sz="1400" b="1" dirty="0"/>
           </a:p>
           <a:p>
             <a:pPr marL="0" indent="0">
               <a:buNone/>
             </a:pPr>
-            <a:r>
-              <a:rPr lang="en-US" sz="1600" b="1" dirty="0"/>
-              <a:t>IMPORTANT NOTE</a:t>
-            </a:r>
-          </a:p>
-          <a:p>
-            <a:pPr marL="0" indent="0">
-              <a:buNone/>
-            </a:pPr>
-            <a:r>
-              <a:rPr lang="en-US" sz="1600" dirty="0"/>
-              <a:t>To know the supported JDK and Pact Specification version, refer the official GitHub project:</a:t>
-            </a:r>
-          </a:p>
-          <a:p>
-            <a:r>
-              <a:rPr lang="en-US" sz="1600" b="1" dirty="0">
-                <a:hlinkClick r:id="rId4"/>
-              </a:rPr>
-              <a:t>https://github.com/pact-foundation/pact-jvm</a:t>
-            </a:r>
-            <a:endParaRPr lang="en-US" sz="1600" b="1" dirty="0"/>
-          </a:p>
-          <a:p>
-            <a:pPr marL="0" indent="0">
-              <a:buNone/>
-            </a:pPr>
-            <a:endParaRPr lang="en-US" sz="1600" dirty="0"/>
+            <a:endParaRPr lang="en-US" sz="1400" dirty="0"/>
           </a:p>
         </p:txBody>
       </p:sp>

</xml_diff>

<commit_message>
PPT: added session 5 slides for contract sharing using pactflow
</commit_message>
<xml_diff>
--- a/setup-guide/Hands-on Pact.pptx
+++ b/setup-guide/Hands-on Pact.pptx
@@ -5,7 +5,7 @@
     <p:sldMasterId id="2147483689" r:id="rId1"/>
   </p:sldMasterIdLst>
   <p:notesMasterIdLst>
-    <p:notesMasterId r:id="rId32"/>
+    <p:notesMasterId r:id="rId33"/>
   </p:notesMasterIdLst>
   <p:sldIdLst>
     <p:sldId id="256" r:id="rId2"/>
@@ -36,8 +36,9 @@
     <p:sldId id="292" r:id="rId27"/>
     <p:sldId id="291" r:id="rId28"/>
     <p:sldId id="284" r:id="rId29"/>
-    <p:sldId id="285" r:id="rId30"/>
-    <p:sldId id="283" r:id="rId31"/>
+    <p:sldId id="294" r:id="rId30"/>
+    <p:sldId id="285" r:id="rId31"/>
+    <p:sldId id="283" r:id="rId32"/>
   </p:sldIdLst>
   <p:sldSz cx="12192000" cy="6858000"/>
   <p:notesSz cx="6858000" cy="9144000"/>
@@ -13478,7 +13479,7 @@
           <a:p>
             <a:fld id="{CFA7EAFB-8655-4DEA-B26A-4F9D15C31331}" type="datetimeFigureOut">
               <a:rPr lang="en-US" smtClean="0"/>
-              <a:t>9/22/2023</a:t>
+              <a:t>9/26/2023</a:t>
             </a:fld>
             <a:endParaRPr lang="en-US"/>
           </a:p>
@@ -13976,7 +13977,7 @@
           <a:p>
             <a:fld id="{098E7344-A9C5-48D3-AF8E-FD54B3B42FB9}" type="datetimeFigureOut">
               <a:rPr lang="en-US" smtClean="0"/>
-              <a:t>9/22/2023</a:t>
+              <a:t>9/26/2023</a:t>
             </a:fld>
             <a:endParaRPr lang="en-US"/>
           </a:p>
@@ -14174,7 +14175,7 @@
           <a:p>
             <a:fld id="{098E7344-A9C5-48D3-AF8E-FD54B3B42FB9}" type="datetimeFigureOut">
               <a:rPr lang="en-US" smtClean="0"/>
-              <a:t>9/22/2023</a:t>
+              <a:t>9/26/2023</a:t>
             </a:fld>
             <a:endParaRPr lang="en-US"/>
           </a:p>
@@ -14382,7 +14383,7 @@
           <a:p>
             <a:fld id="{098E7344-A9C5-48D3-AF8E-FD54B3B42FB9}" type="datetimeFigureOut">
               <a:rPr lang="en-US" smtClean="0"/>
-              <a:t>9/22/2023</a:t>
+              <a:t>9/26/2023</a:t>
             </a:fld>
             <a:endParaRPr lang="en-US"/>
           </a:p>
@@ -14580,7 +14581,7 @@
           <a:p>
             <a:fld id="{098E7344-A9C5-48D3-AF8E-FD54B3B42FB9}" type="datetimeFigureOut">
               <a:rPr lang="en-US" smtClean="0"/>
-              <a:t>9/22/2023</a:t>
+              <a:t>9/26/2023</a:t>
             </a:fld>
             <a:endParaRPr lang="en-US"/>
           </a:p>
@@ -14855,7 +14856,7 @@
           <a:p>
             <a:fld id="{098E7344-A9C5-48D3-AF8E-FD54B3B42FB9}" type="datetimeFigureOut">
               <a:rPr lang="en-US" smtClean="0"/>
-              <a:t>9/22/2023</a:t>
+              <a:t>9/26/2023</a:t>
             </a:fld>
             <a:endParaRPr lang="en-US"/>
           </a:p>
@@ -15120,7 +15121,7 @@
           <a:p>
             <a:fld id="{098E7344-A9C5-48D3-AF8E-FD54B3B42FB9}" type="datetimeFigureOut">
               <a:rPr lang="en-US" smtClean="0"/>
-              <a:t>9/22/2023</a:t>
+              <a:t>9/26/2023</a:t>
             </a:fld>
             <a:endParaRPr lang="en-US"/>
           </a:p>
@@ -15532,7 +15533,7 @@
           <a:p>
             <a:fld id="{098E7344-A9C5-48D3-AF8E-FD54B3B42FB9}" type="datetimeFigureOut">
               <a:rPr lang="en-US" smtClean="0"/>
-              <a:t>9/22/2023</a:t>
+              <a:t>9/26/2023</a:t>
             </a:fld>
             <a:endParaRPr lang="en-US"/>
           </a:p>
@@ -15673,7 +15674,7 @@
           <a:p>
             <a:fld id="{098E7344-A9C5-48D3-AF8E-FD54B3B42FB9}" type="datetimeFigureOut">
               <a:rPr lang="en-US" smtClean="0"/>
-              <a:t>9/22/2023</a:t>
+              <a:t>9/26/2023</a:t>
             </a:fld>
             <a:endParaRPr lang="en-US"/>
           </a:p>
@@ -15786,7 +15787,7 @@
           <a:p>
             <a:fld id="{098E7344-A9C5-48D3-AF8E-FD54B3B42FB9}" type="datetimeFigureOut">
               <a:rPr lang="en-US" smtClean="0"/>
-              <a:t>9/22/2023</a:t>
+              <a:t>9/26/2023</a:t>
             </a:fld>
             <a:endParaRPr lang="en-US"/>
           </a:p>
@@ -16097,7 +16098,7 @@
           <a:p>
             <a:fld id="{098E7344-A9C5-48D3-AF8E-FD54B3B42FB9}" type="datetimeFigureOut">
               <a:rPr lang="en-US" smtClean="0"/>
-              <a:t>9/22/2023</a:t>
+              <a:t>9/26/2023</a:t>
             </a:fld>
             <a:endParaRPr lang="en-US"/>
           </a:p>
@@ -16385,7 +16386,7 @@
           <a:p>
             <a:fld id="{098E7344-A9C5-48D3-AF8E-FD54B3B42FB9}" type="datetimeFigureOut">
               <a:rPr lang="en-US" smtClean="0"/>
-              <a:t>9/22/2023</a:t>
+              <a:t>9/26/2023</a:t>
             </a:fld>
             <a:endParaRPr lang="en-US"/>
           </a:p>
@@ -16626,7 +16627,7 @@
           <a:p>
             <a:fld id="{098E7344-A9C5-48D3-AF8E-FD54B3B42FB9}" type="datetimeFigureOut">
               <a:rPr lang="en-US" smtClean="0"/>
-              <a:t>9/22/2023</a:t>
+              <a:t>9/26/2023</a:t>
             </a:fld>
             <a:endParaRPr lang="en-US"/>
           </a:p>
@@ -33882,10 +33883,7 @@
     <p:bg>
       <p:bgPr>
         <a:solidFill>
-          <a:schemeClr val="bg1">
-            <a:tint val="95000"/>
-            <a:satMod val="170000"/>
-          </a:schemeClr>
+          <a:schemeClr val="bg1"/>
         </a:solidFill>
         <a:effectLst/>
       </p:bgPr>
@@ -33904,12 +33902,12 @@
           <a:chExt cx="0" cy="0"/>
         </a:xfrm>
       </p:grpSpPr>
-      <p:sp>
+      <p:sp useBgFill="1">
         <p:nvSpPr>
-          <p:cNvPr id="9" name="Freeform: Shape 8">
+          <p:cNvPr id="8" name="Rectangle 7">
             <a:extLst>
               <a:ext uri="{FF2B5EF4-FFF2-40B4-BE49-F238E27FC236}">
-                <a16:creationId xmlns:a16="http://schemas.microsoft.com/office/drawing/2014/main" id="{66B332A4-D438-4773-A77F-5ED49A448D9D}"/>
+                <a16:creationId xmlns:a16="http://schemas.microsoft.com/office/drawing/2014/main" id="{100EDD19-6802-4EC3-95CE-CFFAB042CFD6}"/>
               </a:ext>
               <a:ext uri="{C183D7F6-B498-43B3-948B-1728B52AA6E4}">
                 <adec:decorative xmlns:adec="http://schemas.microsoft.com/office/drawing/2017/decorative" val="1"/>
@@ -33929,116 +33927,12 @@
         </p:nvSpPr>
         <p:spPr>
           <a:xfrm>
-            <a:off x="1953768" y="0"/>
-            <a:ext cx="8284464" cy="6858000"/>
+            <a:off x="0" y="0"/>
+            <a:ext cx="12188952" cy="6858000"/>
           </a:xfrm>
-          <a:custGeom>
+          <a:prstGeom prst="rect">
             <a:avLst/>
-            <a:gdLst>
-              <a:gd name="connsiteX0" fmla="*/ 1818109 w 8284464"/>
-              <a:gd name="connsiteY0" fmla="*/ 0 h 6858000"/>
-              <a:gd name="connsiteX1" fmla="*/ 6466355 w 8284464"/>
-              <a:gd name="connsiteY1" fmla="*/ 0 h 6858000"/>
-              <a:gd name="connsiteX2" fmla="*/ 6620596 w 8284464"/>
-              <a:gd name="connsiteY2" fmla="*/ 109683 h 6858000"/>
-              <a:gd name="connsiteX3" fmla="*/ 8284464 w 8284464"/>
-              <a:gd name="connsiteY3" fmla="*/ 3429000 h 6858000"/>
-              <a:gd name="connsiteX4" fmla="*/ 6620596 w 8284464"/>
-              <a:gd name="connsiteY4" fmla="*/ 6748318 h 6858000"/>
-              <a:gd name="connsiteX5" fmla="*/ 6466355 w 8284464"/>
-              <a:gd name="connsiteY5" fmla="*/ 6858000 h 6858000"/>
-              <a:gd name="connsiteX6" fmla="*/ 1818109 w 8284464"/>
-              <a:gd name="connsiteY6" fmla="*/ 6858000 h 6858000"/>
-              <a:gd name="connsiteX7" fmla="*/ 1663869 w 8284464"/>
-              <a:gd name="connsiteY7" fmla="*/ 6748318 h 6858000"/>
-              <a:gd name="connsiteX8" fmla="*/ 0 w 8284464"/>
-              <a:gd name="connsiteY8" fmla="*/ 3429000 h 6858000"/>
-              <a:gd name="connsiteX9" fmla="*/ 1663869 w 8284464"/>
-              <a:gd name="connsiteY9" fmla="*/ 109683 h 6858000"/>
-            </a:gdLst>
-            <a:ahLst/>
-            <a:cxnLst>
-              <a:cxn ang="0">
-                <a:pos x="connsiteX0" y="connsiteY0"/>
-              </a:cxn>
-              <a:cxn ang="0">
-                <a:pos x="connsiteX1" y="connsiteY1"/>
-              </a:cxn>
-              <a:cxn ang="0">
-                <a:pos x="connsiteX2" y="connsiteY2"/>
-              </a:cxn>
-              <a:cxn ang="0">
-                <a:pos x="connsiteX3" y="connsiteY3"/>
-              </a:cxn>
-              <a:cxn ang="0">
-                <a:pos x="connsiteX4" y="connsiteY4"/>
-              </a:cxn>
-              <a:cxn ang="0">
-                <a:pos x="connsiteX5" y="connsiteY5"/>
-              </a:cxn>
-              <a:cxn ang="0">
-                <a:pos x="connsiteX6" y="connsiteY6"/>
-              </a:cxn>
-              <a:cxn ang="0">
-                <a:pos x="connsiteX7" y="connsiteY7"/>
-              </a:cxn>
-              <a:cxn ang="0">
-                <a:pos x="connsiteX8" y="connsiteY8"/>
-              </a:cxn>
-              <a:cxn ang="0">
-                <a:pos x="connsiteX9" y="connsiteY9"/>
-              </a:cxn>
-            </a:cxnLst>
-            <a:rect l="l" t="t" r="r" b="b"/>
-            <a:pathLst>
-              <a:path w="8284464" h="6858000">
-                <a:moveTo>
-                  <a:pt x="1818109" y="0"/>
-                </a:moveTo>
-                <a:lnTo>
-                  <a:pt x="6466355" y="0"/>
-                </a:lnTo>
-                <a:lnTo>
-                  <a:pt x="6620596" y="109683"/>
-                </a:lnTo>
-                <a:cubicBezTo>
-                  <a:pt x="7630666" y="865069"/>
-                  <a:pt x="8284464" y="2070683"/>
-                  <a:pt x="8284464" y="3429000"/>
-                </a:cubicBezTo>
-                <a:cubicBezTo>
-                  <a:pt x="8284464" y="4787317"/>
-                  <a:pt x="7630666" y="5992931"/>
-                  <a:pt x="6620596" y="6748318"/>
-                </a:cubicBezTo>
-                <a:lnTo>
-                  <a:pt x="6466355" y="6858000"/>
-                </a:lnTo>
-                <a:lnTo>
-                  <a:pt x="1818109" y="6858000"/>
-                </a:lnTo>
-                <a:lnTo>
-                  <a:pt x="1663869" y="6748318"/>
-                </a:lnTo>
-                <a:cubicBezTo>
-                  <a:pt x="653798" y="5992931"/>
-                  <a:pt x="0" y="4787317"/>
-                  <a:pt x="0" y="3429000"/>
-                </a:cubicBezTo>
-                <a:cubicBezTo>
-                  <a:pt x="0" y="2070683"/>
-                  <a:pt x="653798" y="865069"/>
-                  <a:pt x="1663869" y="109683"/>
-                </a:cubicBezTo>
-                <a:close/>
-              </a:path>
-            </a:pathLst>
-          </a:custGeom>
-          <a:solidFill>
-            <a:srgbClr val="FFFFFF">
-              <a:alpha val="80000"/>
-            </a:srgbClr>
-          </a:solidFill>
+          </a:prstGeom>
           <a:ln>
             <a:noFill/>
           </a:ln>
@@ -34060,9 +33954,7 @@
           </a:fontRef>
         </p:style>
         <p:txBody>
-          <a:bodyPr wrap="square" rtlCol="0" anchor="ctr">
-            <a:noAutofit/>
-          </a:bodyPr>
+          <a:bodyPr rtlCol="0" anchor="ctr"/>
           <a:lstStyle/>
           <a:p>
             <a:pPr algn="ctr"/>
@@ -34072,10 +33964,50 @@
       </p:sp>
       <p:sp>
         <p:nvSpPr>
-          <p:cNvPr id="11" name="Freeform: Shape 10">
+          <p:cNvPr id="2" name="Title 1">
             <a:extLst>
               <a:ext uri="{FF2B5EF4-FFF2-40B4-BE49-F238E27FC236}">
-                <a16:creationId xmlns:a16="http://schemas.microsoft.com/office/drawing/2014/main" id="{DF9AD32D-FF05-44F4-BD4D-9CEE89B71EB9}"/>
+                <a16:creationId xmlns:a16="http://schemas.microsoft.com/office/drawing/2014/main" id="{1AB375DD-BF8E-F8FE-D27F-7B7E9E9750D2}"/>
+              </a:ext>
+            </a:extLst>
+          </p:cNvPr>
+          <p:cNvSpPr>
+            <a:spLocks noGrp="1"/>
+          </p:cNvSpPr>
+          <p:nvPr>
+            <p:ph type="title"/>
+          </p:nvPr>
+        </p:nvSpPr>
+        <p:spPr>
+          <a:xfrm>
+            <a:off x="838200" y="365125"/>
+            <a:ext cx="10515600" cy="1325563"/>
+          </a:xfrm>
+        </p:spPr>
+        <p:txBody>
+          <a:bodyPr>
+            <a:noAutofit/>
+          </a:bodyPr>
+          <a:lstStyle/>
+          <a:p>
+            <a:r>
+              <a:rPr lang="en-US" sz="4000" b="1" dirty="0"/>
+              <a:t>Contract Sharing and verification using </a:t>
+            </a:r>
+            <a:r>
+              <a:rPr lang="en-US" sz="4000" b="1" dirty="0" err="1"/>
+              <a:t>Pactflow</a:t>
+            </a:r>
+            <a:endParaRPr lang="en-US" sz="4000" b="1" dirty="0"/>
+          </a:p>
+        </p:txBody>
+      </p:sp>
+      <p:sp>
+        <p:nvSpPr>
+          <p:cNvPr id="10" name="sketch line">
+            <a:extLst>
+              <a:ext uri="{FF2B5EF4-FFF2-40B4-BE49-F238E27FC236}">
+                <a16:creationId xmlns:a16="http://schemas.microsoft.com/office/drawing/2014/main" id="{DB17E863-922E-4C26-BD64-E8FD41D28661}"/>
               </a:ext>
               <a:ext uri="{C183D7F6-B498-43B3-948B-1728B52AA6E4}">
                 <adec:decorative xmlns:adec="http://schemas.microsoft.com/office/drawing/2017/decorative" val="1"/>
@@ -34095,32 +34027,84 @@
         </p:nvSpPr>
         <p:spPr>
           <a:xfrm>
-            <a:off x="2118360" y="0"/>
-            <a:ext cx="7955280" cy="6858000"/>
+            <a:off x="669036" y="1677373"/>
+            <a:ext cx="10853928" cy="18288"/>
           </a:xfrm>
           <a:custGeom>
             <a:avLst/>
             <a:gdLst>
-              <a:gd name="connsiteX0" fmla="*/ 1962423 w 7955280"/>
-              <a:gd name="connsiteY0" fmla="*/ 0 h 6858000"/>
-              <a:gd name="connsiteX1" fmla="*/ 5992858 w 7955280"/>
-              <a:gd name="connsiteY1" fmla="*/ 0 h 6858000"/>
-              <a:gd name="connsiteX2" fmla="*/ 6040191 w 7955280"/>
-              <a:gd name="connsiteY2" fmla="*/ 27216 h 6858000"/>
-              <a:gd name="connsiteX3" fmla="*/ 7955280 w 7955280"/>
-              <a:gd name="connsiteY3" fmla="*/ 3429000 h 6858000"/>
-              <a:gd name="connsiteX4" fmla="*/ 6040191 w 7955280"/>
-              <a:gd name="connsiteY4" fmla="*/ 6830784 h 6858000"/>
-              <a:gd name="connsiteX5" fmla="*/ 5992858 w 7955280"/>
-              <a:gd name="connsiteY5" fmla="*/ 6858000 h 6858000"/>
-              <a:gd name="connsiteX6" fmla="*/ 1962423 w 7955280"/>
-              <a:gd name="connsiteY6" fmla="*/ 6858000 h 6858000"/>
-              <a:gd name="connsiteX7" fmla="*/ 1915089 w 7955280"/>
-              <a:gd name="connsiteY7" fmla="*/ 6830784 h 6858000"/>
-              <a:gd name="connsiteX8" fmla="*/ 0 w 7955280"/>
-              <a:gd name="connsiteY8" fmla="*/ 3429000 h 6858000"/>
-              <a:gd name="connsiteX9" fmla="*/ 1915089 w 7955280"/>
-              <a:gd name="connsiteY9" fmla="*/ 27216 h 6858000"/>
+              <a:gd name="connsiteX0" fmla="*/ 0 w 10853928"/>
+              <a:gd name="connsiteY0" fmla="*/ 0 h 18288"/>
+              <a:gd name="connsiteX1" fmla="*/ 461292 w 10853928"/>
+              <a:gd name="connsiteY1" fmla="*/ 0 h 18288"/>
+              <a:gd name="connsiteX2" fmla="*/ 1139662 w 10853928"/>
+              <a:gd name="connsiteY2" fmla="*/ 0 h 18288"/>
+              <a:gd name="connsiteX3" fmla="*/ 1926572 w 10853928"/>
+              <a:gd name="connsiteY3" fmla="*/ 0 h 18288"/>
+              <a:gd name="connsiteX4" fmla="*/ 2279325 w 10853928"/>
+              <a:gd name="connsiteY4" fmla="*/ 0 h 18288"/>
+              <a:gd name="connsiteX5" fmla="*/ 2632078 w 10853928"/>
+              <a:gd name="connsiteY5" fmla="*/ 0 h 18288"/>
+              <a:gd name="connsiteX6" fmla="*/ 3527527 w 10853928"/>
+              <a:gd name="connsiteY6" fmla="*/ 0 h 18288"/>
+              <a:gd name="connsiteX7" fmla="*/ 4205897 w 10853928"/>
+              <a:gd name="connsiteY7" fmla="*/ 0 h 18288"/>
+              <a:gd name="connsiteX8" fmla="*/ 4558650 w 10853928"/>
+              <a:gd name="connsiteY8" fmla="*/ 0 h 18288"/>
+              <a:gd name="connsiteX9" fmla="*/ 5237020 w 10853928"/>
+              <a:gd name="connsiteY9" fmla="*/ 0 h 18288"/>
+              <a:gd name="connsiteX10" fmla="*/ 6132469 w 10853928"/>
+              <a:gd name="connsiteY10" fmla="*/ 0 h 18288"/>
+              <a:gd name="connsiteX11" fmla="*/ 6702301 w 10853928"/>
+              <a:gd name="connsiteY11" fmla="*/ 0 h 18288"/>
+              <a:gd name="connsiteX12" fmla="*/ 7272132 w 10853928"/>
+              <a:gd name="connsiteY12" fmla="*/ 0 h 18288"/>
+              <a:gd name="connsiteX13" fmla="*/ 7950502 w 10853928"/>
+              <a:gd name="connsiteY13" fmla="*/ 0 h 18288"/>
+              <a:gd name="connsiteX14" fmla="*/ 8737412 w 10853928"/>
+              <a:gd name="connsiteY14" fmla="*/ 0 h 18288"/>
+              <a:gd name="connsiteX15" fmla="*/ 9524322 w 10853928"/>
+              <a:gd name="connsiteY15" fmla="*/ 0 h 18288"/>
+              <a:gd name="connsiteX16" fmla="*/ 10853928 w 10853928"/>
+              <a:gd name="connsiteY16" fmla="*/ 0 h 18288"/>
+              <a:gd name="connsiteX17" fmla="*/ 10853928 w 10853928"/>
+              <a:gd name="connsiteY17" fmla="*/ 18288 h 18288"/>
+              <a:gd name="connsiteX18" fmla="*/ 10392636 w 10853928"/>
+              <a:gd name="connsiteY18" fmla="*/ 18288 h 18288"/>
+              <a:gd name="connsiteX19" fmla="*/ 9497187 w 10853928"/>
+              <a:gd name="connsiteY19" fmla="*/ 18288 h 18288"/>
+              <a:gd name="connsiteX20" fmla="*/ 8818817 w 10853928"/>
+              <a:gd name="connsiteY20" fmla="*/ 18288 h 18288"/>
+              <a:gd name="connsiteX21" fmla="*/ 8466064 w 10853928"/>
+              <a:gd name="connsiteY21" fmla="*/ 18288 h 18288"/>
+              <a:gd name="connsiteX22" fmla="*/ 7787693 w 10853928"/>
+              <a:gd name="connsiteY22" fmla="*/ 18288 h 18288"/>
+              <a:gd name="connsiteX23" fmla="*/ 7217862 w 10853928"/>
+              <a:gd name="connsiteY23" fmla="*/ 18288 h 18288"/>
+              <a:gd name="connsiteX24" fmla="*/ 6648031 w 10853928"/>
+              <a:gd name="connsiteY24" fmla="*/ 18288 h 18288"/>
+              <a:gd name="connsiteX25" fmla="*/ 6078200 w 10853928"/>
+              <a:gd name="connsiteY25" fmla="*/ 18288 h 18288"/>
+              <a:gd name="connsiteX26" fmla="*/ 5508368 w 10853928"/>
+              <a:gd name="connsiteY26" fmla="*/ 18288 h 18288"/>
+              <a:gd name="connsiteX27" fmla="*/ 4721459 w 10853928"/>
+              <a:gd name="connsiteY27" fmla="*/ 18288 h 18288"/>
+              <a:gd name="connsiteX28" fmla="*/ 4043088 w 10853928"/>
+              <a:gd name="connsiteY28" fmla="*/ 18288 h 18288"/>
+              <a:gd name="connsiteX29" fmla="*/ 3690336 w 10853928"/>
+              <a:gd name="connsiteY29" fmla="*/ 18288 h 18288"/>
+              <a:gd name="connsiteX30" fmla="*/ 3120504 w 10853928"/>
+              <a:gd name="connsiteY30" fmla="*/ 18288 h 18288"/>
+              <a:gd name="connsiteX31" fmla="*/ 2333595 w 10853928"/>
+              <a:gd name="connsiteY31" fmla="*/ 18288 h 18288"/>
+              <a:gd name="connsiteX32" fmla="*/ 1872303 w 10853928"/>
+              <a:gd name="connsiteY32" fmla="*/ 18288 h 18288"/>
+              <a:gd name="connsiteX33" fmla="*/ 976854 w 10853928"/>
+              <a:gd name="connsiteY33" fmla="*/ 18288 h 18288"/>
+              <a:gd name="connsiteX34" fmla="*/ 0 w 10853928"/>
+              <a:gd name="connsiteY34" fmla="*/ 18288 h 18288"/>
+              <a:gd name="connsiteX35" fmla="*/ 0 w 10853928"/>
+              <a:gd name="connsiteY35" fmla="*/ 0 h 18288"/>
             </a:gdLst>
             <a:ahLst/>
             <a:cxnLst>
@@ -34154,57 +34138,481 @@
               <a:cxn ang="0">
                 <a:pos x="connsiteX9" y="connsiteY9"/>
               </a:cxn>
+              <a:cxn ang="0">
+                <a:pos x="connsiteX10" y="connsiteY10"/>
+              </a:cxn>
+              <a:cxn ang="0">
+                <a:pos x="connsiteX11" y="connsiteY11"/>
+              </a:cxn>
+              <a:cxn ang="0">
+                <a:pos x="connsiteX12" y="connsiteY12"/>
+              </a:cxn>
+              <a:cxn ang="0">
+                <a:pos x="connsiteX13" y="connsiteY13"/>
+              </a:cxn>
+              <a:cxn ang="0">
+                <a:pos x="connsiteX14" y="connsiteY14"/>
+              </a:cxn>
+              <a:cxn ang="0">
+                <a:pos x="connsiteX15" y="connsiteY15"/>
+              </a:cxn>
+              <a:cxn ang="0">
+                <a:pos x="connsiteX16" y="connsiteY16"/>
+              </a:cxn>
+              <a:cxn ang="0">
+                <a:pos x="connsiteX17" y="connsiteY17"/>
+              </a:cxn>
+              <a:cxn ang="0">
+                <a:pos x="connsiteX18" y="connsiteY18"/>
+              </a:cxn>
+              <a:cxn ang="0">
+                <a:pos x="connsiteX19" y="connsiteY19"/>
+              </a:cxn>
+              <a:cxn ang="0">
+                <a:pos x="connsiteX20" y="connsiteY20"/>
+              </a:cxn>
+              <a:cxn ang="0">
+                <a:pos x="connsiteX21" y="connsiteY21"/>
+              </a:cxn>
+              <a:cxn ang="0">
+                <a:pos x="connsiteX22" y="connsiteY22"/>
+              </a:cxn>
+              <a:cxn ang="0">
+                <a:pos x="connsiteX23" y="connsiteY23"/>
+              </a:cxn>
+              <a:cxn ang="0">
+                <a:pos x="connsiteX24" y="connsiteY24"/>
+              </a:cxn>
+              <a:cxn ang="0">
+                <a:pos x="connsiteX25" y="connsiteY25"/>
+              </a:cxn>
+              <a:cxn ang="0">
+                <a:pos x="connsiteX26" y="connsiteY26"/>
+              </a:cxn>
+              <a:cxn ang="0">
+                <a:pos x="connsiteX27" y="connsiteY27"/>
+              </a:cxn>
+              <a:cxn ang="0">
+                <a:pos x="connsiteX28" y="connsiteY28"/>
+              </a:cxn>
+              <a:cxn ang="0">
+                <a:pos x="connsiteX29" y="connsiteY29"/>
+              </a:cxn>
+              <a:cxn ang="0">
+                <a:pos x="connsiteX30" y="connsiteY30"/>
+              </a:cxn>
+              <a:cxn ang="0">
+                <a:pos x="connsiteX31" y="connsiteY31"/>
+              </a:cxn>
+              <a:cxn ang="0">
+                <a:pos x="connsiteX32" y="connsiteY32"/>
+              </a:cxn>
+              <a:cxn ang="0">
+                <a:pos x="connsiteX33" y="connsiteY33"/>
+              </a:cxn>
+              <a:cxn ang="0">
+                <a:pos x="connsiteX34" y="connsiteY34"/>
+              </a:cxn>
+              <a:cxn ang="0">
+                <a:pos x="connsiteX35" y="connsiteY35"/>
+              </a:cxn>
             </a:cxnLst>
             <a:rect l="l" t="t" r="r" b="b"/>
             <a:pathLst>
-              <a:path w="7955280" h="6858000">
+              <a:path w="10853928" h="18288" fill="none" extrusionOk="0">
                 <a:moveTo>
-                  <a:pt x="1962423" y="0"/>
+                  <a:pt x="0" y="0"/>
                 </a:moveTo>
-                <a:lnTo>
-                  <a:pt x="5992858" y="0"/>
-                </a:lnTo>
-                <a:lnTo>
-                  <a:pt x="6040191" y="27216"/>
-                </a:lnTo>
-                <a:cubicBezTo>
-                  <a:pt x="7188332" y="724844"/>
-                  <a:pt x="7955280" y="1987357"/>
-                  <a:pt x="7955280" y="3429000"/>
-                </a:cubicBezTo>
-                <a:cubicBezTo>
-                  <a:pt x="7955280" y="4870644"/>
-                  <a:pt x="7188332" y="6133157"/>
-                  <a:pt x="6040191" y="6830784"/>
-                </a:cubicBezTo>
-                <a:lnTo>
-                  <a:pt x="5992858" y="6858000"/>
-                </a:lnTo>
-                <a:lnTo>
-                  <a:pt x="1962423" y="6858000"/>
-                </a:lnTo>
-                <a:lnTo>
-                  <a:pt x="1915089" y="6830784"/>
-                </a:lnTo>
-                <a:cubicBezTo>
-                  <a:pt x="766948" y="6133157"/>
-                  <a:pt x="0" y="4870644"/>
-                  <a:pt x="0" y="3429000"/>
-                </a:cubicBezTo>
-                <a:cubicBezTo>
-                  <a:pt x="0" y="1987357"/>
-                  <a:pt x="766948" y="724844"/>
-                  <a:pt x="1915089" y="27216"/>
+                <a:cubicBezTo>
+                  <a:pt x="146993" y="-19076"/>
+                  <a:pt x="347684" y="-4790"/>
+                  <a:pt x="461292" y="0"/>
+                </a:cubicBezTo>
+                <a:cubicBezTo>
+                  <a:pt x="574900" y="4790"/>
+                  <a:pt x="808367" y="19821"/>
+                  <a:pt x="1139662" y="0"/>
+                </a:cubicBezTo>
+                <a:cubicBezTo>
+                  <a:pt x="1470957" y="-19821"/>
+                  <a:pt x="1627405" y="5721"/>
+                  <a:pt x="1926572" y="0"/>
+                </a:cubicBezTo>
+                <a:cubicBezTo>
+                  <a:pt x="2225739" y="-5721"/>
+                  <a:pt x="2137730" y="-3235"/>
+                  <a:pt x="2279325" y="0"/>
+                </a:cubicBezTo>
+                <a:cubicBezTo>
+                  <a:pt x="2420920" y="3235"/>
+                  <a:pt x="2456518" y="9685"/>
+                  <a:pt x="2632078" y="0"/>
+                </a:cubicBezTo>
+                <a:cubicBezTo>
+                  <a:pt x="2807638" y="-9685"/>
+                  <a:pt x="3211516" y="-43007"/>
+                  <a:pt x="3527527" y="0"/>
+                </a:cubicBezTo>
+                <a:cubicBezTo>
+                  <a:pt x="3843538" y="43007"/>
+                  <a:pt x="4058833" y="22042"/>
+                  <a:pt x="4205897" y="0"/>
+                </a:cubicBezTo>
+                <a:cubicBezTo>
+                  <a:pt x="4352961" y="-22042"/>
+                  <a:pt x="4474805" y="-11846"/>
+                  <a:pt x="4558650" y="0"/>
+                </a:cubicBezTo>
+                <a:cubicBezTo>
+                  <a:pt x="4642495" y="11846"/>
+                  <a:pt x="5041928" y="-6069"/>
+                  <a:pt x="5237020" y="0"/>
+                </a:cubicBezTo>
+                <a:cubicBezTo>
+                  <a:pt x="5432112" y="6069"/>
+                  <a:pt x="5943266" y="-17479"/>
+                  <a:pt x="6132469" y="0"/>
+                </a:cubicBezTo>
+                <a:cubicBezTo>
+                  <a:pt x="6321672" y="17479"/>
+                  <a:pt x="6483872" y="26234"/>
+                  <a:pt x="6702301" y="0"/>
+                </a:cubicBezTo>
+                <a:cubicBezTo>
+                  <a:pt x="6920730" y="-26234"/>
+                  <a:pt x="6991194" y="-15156"/>
+                  <a:pt x="7272132" y="0"/>
+                </a:cubicBezTo>
+                <a:cubicBezTo>
+                  <a:pt x="7553070" y="15156"/>
+                  <a:pt x="7684444" y="-32961"/>
+                  <a:pt x="7950502" y="0"/>
+                </a:cubicBezTo>
+                <a:cubicBezTo>
+                  <a:pt x="8216560" y="32961"/>
+                  <a:pt x="8493290" y="-10491"/>
+                  <a:pt x="8737412" y="0"/>
+                </a:cubicBezTo>
+                <a:cubicBezTo>
+                  <a:pt x="8981534" y="10491"/>
+                  <a:pt x="9191586" y="-13899"/>
+                  <a:pt x="9524322" y="0"/>
+                </a:cubicBezTo>
+                <a:cubicBezTo>
+                  <a:pt x="9857058" y="13899"/>
+                  <a:pt x="10297509" y="7485"/>
+                  <a:pt x="10853928" y="0"/>
+                </a:cubicBezTo>
+                <a:cubicBezTo>
+                  <a:pt x="10854574" y="4451"/>
+                  <a:pt x="10854418" y="9226"/>
+                  <a:pt x="10853928" y="18288"/>
+                </a:cubicBezTo>
+                <a:cubicBezTo>
+                  <a:pt x="10691638" y="28522"/>
+                  <a:pt x="10574319" y="29578"/>
+                  <a:pt x="10392636" y="18288"/>
+                </a:cubicBezTo>
+                <a:cubicBezTo>
+                  <a:pt x="10210953" y="6998"/>
+                  <a:pt x="9836277" y="-16742"/>
+                  <a:pt x="9497187" y="18288"/>
+                </a:cubicBezTo>
+                <a:cubicBezTo>
+                  <a:pt x="9158097" y="53318"/>
+                  <a:pt x="9119479" y="30714"/>
+                  <a:pt x="8818817" y="18288"/>
+                </a:cubicBezTo>
+                <a:cubicBezTo>
+                  <a:pt x="8518155" y="5863"/>
+                  <a:pt x="8640037" y="6483"/>
+                  <a:pt x="8466064" y="18288"/>
+                </a:cubicBezTo>
+                <a:cubicBezTo>
+                  <a:pt x="8292091" y="30093"/>
+                  <a:pt x="7997656" y="18914"/>
+                  <a:pt x="7787693" y="18288"/>
+                </a:cubicBezTo>
+                <a:cubicBezTo>
+                  <a:pt x="7577730" y="17662"/>
+                  <a:pt x="7412468" y="21416"/>
+                  <a:pt x="7217862" y="18288"/>
+                </a:cubicBezTo>
+                <a:cubicBezTo>
+                  <a:pt x="7023256" y="15160"/>
+                  <a:pt x="6898018" y="14824"/>
+                  <a:pt x="6648031" y="18288"/>
+                </a:cubicBezTo>
+                <a:cubicBezTo>
+                  <a:pt x="6398044" y="21752"/>
+                  <a:pt x="6254402" y="38625"/>
+                  <a:pt x="6078200" y="18288"/>
+                </a:cubicBezTo>
+                <a:cubicBezTo>
+                  <a:pt x="5901998" y="-2049"/>
+                  <a:pt x="5622886" y="3213"/>
+                  <a:pt x="5508368" y="18288"/>
+                </a:cubicBezTo>
+                <a:cubicBezTo>
+                  <a:pt x="5393850" y="33363"/>
+                  <a:pt x="5036260" y="26830"/>
+                  <a:pt x="4721459" y="18288"/>
+                </a:cubicBezTo>
+                <a:cubicBezTo>
+                  <a:pt x="4406658" y="9746"/>
+                  <a:pt x="4239221" y="41551"/>
+                  <a:pt x="4043088" y="18288"/>
+                </a:cubicBezTo>
+                <a:cubicBezTo>
+                  <a:pt x="3846955" y="-4975"/>
+                  <a:pt x="3818802" y="34658"/>
+                  <a:pt x="3690336" y="18288"/>
+                </a:cubicBezTo>
+                <a:cubicBezTo>
+                  <a:pt x="3561870" y="1918"/>
+                  <a:pt x="3265491" y="42194"/>
+                  <a:pt x="3120504" y="18288"/>
+                </a:cubicBezTo>
+                <a:cubicBezTo>
+                  <a:pt x="2975517" y="-5618"/>
+                  <a:pt x="2720254" y="36673"/>
+                  <a:pt x="2333595" y="18288"/>
+                </a:cubicBezTo>
+                <a:cubicBezTo>
+                  <a:pt x="1946936" y="-97"/>
+                  <a:pt x="2097241" y="5776"/>
+                  <a:pt x="1872303" y="18288"/>
+                </a:cubicBezTo>
+                <a:cubicBezTo>
+                  <a:pt x="1647365" y="30800"/>
+                  <a:pt x="1282708" y="45380"/>
+                  <a:pt x="976854" y="18288"/>
+                </a:cubicBezTo>
+                <a:cubicBezTo>
+                  <a:pt x="671000" y="-8804"/>
+                  <a:pt x="408401" y="-12775"/>
+                  <a:pt x="0" y="18288"/>
+                </a:cubicBezTo>
+                <a:cubicBezTo>
+                  <a:pt x="-213" y="9468"/>
+                  <a:pt x="187" y="4459"/>
+                  <a:pt x="0" y="0"/>
+                </a:cubicBezTo>
+                <a:close/>
+              </a:path>
+              <a:path w="10853928" h="18288" stroke="0" extrusionOk="0">
+                <a:moveTo>
+                  <a:pt x="0" y="0"/>
+                </a:moveTo>
+                <a:cubicBezTo>
+                  <a:pt x="267322" y="15284"/>
+                  <a:pt x="415388" y="-21048"/>
+                  <a:pt x="569831" y="0"/>
+                </a:cubicBezTo>
+                <a:cubicBezTo>
+                  <a:pt x="724274" y="21048"/>
+                  <a:pt x="769333" y="-2353"/>
+                  <a:pt x="922584" y="0"/>
+                </a:cubicBezTo>
+                <a:cubicBezTo>
+                  <a:pt x="1075835" y="2353"/>
+                  <a:pt x="1399490" y="-145"/>
+                  <a:pt x="1818033" y="0"/>
+                </a:cubicBezTo>
+                <a:cubicBezTo>
+                  <a:pt x="2236576" y="145"/>
+                  <a:pt x="2145330" y="5482"/>
+                  <a:pt x="2387864" y="0"/>
+                </a:cubicBezTo>
+                <a:cubicBezTo>
+                  <a:pt x="2630398" y="-5482"/>
+                  <a:pt x="2793207" y="18487"/>
+                  <a:pt x="2957695" y="0"/>
+                </a:cubicBezTo>
+                <a:cubicBezTo>
+                  <a:pt x="3122183" y="-18487"/>
+                  <a:pt x="3579141" y="19003"/>
+                  <a:pt x="3853144" y="0"/>
+                </a:cubicBezTo>
+                <a:cubicBezTo>
+                  <a:pt x="4127147" y="-19003"/>
+                  <a:pt x="4209857" y="12211"/>
+                  <a:pt x="4314436" y="0"/>
+                </a:cubicBezTo>
+                <a:cubicBezTo>
+                  <a:pt x="4419015" y="-12211"/>
+                  <a:pt x="4762459" y="-17220"/>
+                  <a:pt x="5209885" y="0"/>
+                </a:cubicBezTo>
+                <a:cubicBezTo>
+                  <a:pt x="5657311" y="17220"/>
+                  <a:pt x="5692663" y="-3290"/>
+                  <a:pt x="6105335" y="0"/>
+                </a:cubicBezTo>
+                <a:cubicBezTo>
+                  <a:pt x="6518007" y="3290"/>
+                  <a:pt x="6455516" y="-5124"/>
+                  <a:pt x="6783705" y="0"/>
+                </a:cubicBezTo>
+                <a:cubicBezTo>
+                  <a:pt x="7111894" y="5124"/>
+                  <a:pt x="7441941" y="-17829"/>
+                  <a:pt x="7679154" y="0"/>
+                </a:cubicBezTo>
+                <a:cubicBezTo>
+                  <a:pt x="7916367" y="17829"/>
+                  <a:pt x="8102967" y="-24363"/>
+                  <a:pt x="8248985" y="0"/>
+                </a:cubicBezTo>
+                <a:cubicBezTo>
+                  <a:pt x="8395003" y="24363"/>
+                  <a:pt x="8552393" y="25505"/>
+                  <a:pt x="8818817" y="0"/>
+                </a:cubicBezTo>
+                <a:cubicBezTo>
+                  <a:pt x="9085241" y="-25505"/>
+                  <a:pt x="9411308" y="38000"/>
+                  <a:pt x="9605726" y="0"/>
+                </a:cubicBezTo>
+                <a:cubicBezTo>
+                  <a:pt x="9800144" y="-38000"/>
+                  <a:pt x="10006468" y="-25741"/>
+                  <a:pt x="10175558" y="0"/>
+                </a:cubicBezTo>
+                <a:cubicBezTo>
+                  <a:pt x="10344648" y="25741"/>
+                  <a:pt x="10696282" y="695"/>
+                  <a:pt x="10853928" y="0"/>
+                </a:cubicBezTo>
+                <a:cubicBezTo>
+                  <a:pt x="10853521" y="8690"/>
+                  <a:pt x="10853774" y="14141"/>
+                  <a:pt x="10853928" y="18288"/>
+                </a:cubicBezTo>
+                <a:cubicBezTo>
+                  <a:pt x="10608124" y="24255"/>
+                  <a:pt x="10343415" y="22307"/>
+                  <a:pt x="10067018" y="18288"/>
+                </a:cubicBezTo>
+                <a:cubicBezTo>
+                  <a:pt x="9790621" y="14270"/>
+                  <a:pt x="9843266" y="3564"/>
+                  <a:pt x="9714266" y="18288"/>
+                </a:cubicBezTo>
+                <a:cubicBezTo>
+                  <a:pt x="9585266" y="33012"/>
+                  <a:pt x="9379484" y="1875"/>
+                  <a:pt x="9252974" y="18288"/>
+                </a:cubicBezTo>
+                <a:cubicBezTo>
+                  <a:pt x="9126464" y="34701"/>
+                  <a:pt x="8580678" y="-4904"/>
+                  <a:pt x="8357525" y="18288"/>
+                </a:cubicBezTo>
+                <a:cubicBezTo>
+                  <a:pt x="8134372" y="41480"/>
+                  <a:pt x="7903199" y="26458"/>
+                  <a:pt x="7679154" y="18288"/>
+                </a:cubicBezTo>
+                <a:cubicBezTo>
+                  <a:pt x="7455109" y="10118"/>
+                  <a:pt x="7435944" y="27109"/>
+                  <a:pt x="7217862" y="18288"/>
+                </a:cubicBezTo>
+                <a:cubicBezTo>
+                  <a:pt x="6999780" y="9467"/>
+                  <a:pt x="6680409" y="18985"/>
+                  <a:pt x="6539492" y="18288"/>
+                </a:cubicBezTo>
+                <a:cubicBezTo>
+                  <a:pt x="6398575" y="17592"/>
+                  <a:pt x="6312077" y="33018"/>
+                  <a:pt x="6186739" y="18288"/>
+                </a:cubicBezTo>
+                <a:cubicBezTo>
+                  <a:pt x="6061401" y="3558"/>
+                  <a:pt x="5947033" y="12075"/>
+                  <a:pt x="5833986" y="18288"/>
+                </a:cubicBezTo>
+                <a:cubicBezTo>
+                  <a:pt x="5720939" y="24501"/>
+                  <a:pt x="5482226" y="8586"/>
+                  <a:pt x="5155616" y="18288"/>
+                </a:cubicBezTo>
+                <a:cubicBezTo>
+                  <a:pt x="4829006" y="27991"/>
+                  <a:pt x="4841274" y="29316"/>
+                  <a:pt x="4694324" y="18288"/>
+                </a:cubicBezTo>
+                <a:cubicBezTo>
+                  <a:pt x="4547374" y="7260"/>
+                  <a:pt x="4077675" y="7013"/>
+                  <a:pt x="3907414" y="18288"/>
+                </a:cubicBezTo>
+                <a:cubicBezTo>
+                  <a:pt x="3737153" y="29564"/>
+                  <a:pt x="3538393" y="21630"/>
+                  <a:pt x="3446122" y="18288"/>
+                </a:cubicBezTo>
+                <a:cubicBezTo>
+                  <a:pt x="3353851" y="14946"/>
+                  <a:pt x="2990320" y="-8091"/>
+                  <a:pt x="2659212" y="18288"/>
+                </a:cubicBezTo>
+                <a:cubicBezTo>
+                  <a:pt x="2328104" y="44667"/>
+                  <a:pt x="2427653" y="9607"/>
+                  <a:pt x="2306460" y="18288"/>
+                </a:cubicBezTo>
+                <a:cubicBezTo>
+                  <a:pt x="2185267" y="26969"/>
+                  <a:pt x="1719763" y="3717"/>
+                  <a:pt x="1519550" y="18288"/>
+                </a:cubicBezTo>
+                <a:cubicBezTo>
+                  <a:pt x="1319337" y="32860"/>
+                  <a:pt x="1167371" y="17040"/>
+                  <a:pt x="1058258" y="18288"/>
+                </a:cubicBezTo>
+                <a:cubicBezTo>
+                  <a:pt x="949145" y="19536"/>
+                  <a:pt x="780234" y="31447"/>
+                  <a:pt x="705505" y="18288"/>
+                </a:cubicBezTo>
+                <a:cubicBezTo>
+                  <a:pt x="630776" y="5129"/>
+                  <a:pt x="215796" y="30056"/>
+                  <a:pt x="0" y="18288"/>
+                </a:cubicBezTo>
+                <a:cubicBezTo>
+                  <a:pt x="-53" y="11301"/>
+                  <a:pt x="-649" y="7756"/>
+                  <a:pt x="0" y="0"/>
                 </a:cubicBezTo>
                 <a:close/>
               </a:path>
             </a:pathLst>
           </a:custGeom>
           <a:solidFill>
-            <a:schemeClr val="tx1"/>
+            <a:schemeClr val="accent2"/>
           </a:solidFill>
-          <a:ln>
-            <a:noFill/>
+          <a:ln w="41275" cap="rnd">
+            <a:solidFill>
+              <a:schemeClr val="accent2"/>
+            </a:solidFill>
+            <a:round/>
+            <a:extLst>
+              <a:ext uri="{C807C97D-BFC1-408E-A445-0C87EB9F89A2}">
+                <ask:lineSketchStyleProps xmlns:ask="http://schemas.microsoft.com/office/drawing/2018/sketchyshapes" sd="1219033472">
+                  <a:prstGeom prst="rect">
+                    <a:avLst/>
+                  </a:prstGeom>
+                  <ask:type>
+                    <ask:lineSketchFreehand/>
+                  </ask:type>
+                </ask:lineSketchStyleProps>
+              </a:ext>
+            </a:extLst>
           </a:ln>
         </p:spPr>
         <p:style>
@@ -34224,9 +34632,7 @@
           </a:fontRef>
         </p:style>
         <p:txBody>
-          <a:bodyPr wrap="square" rtlCol="0" anchor="ctr">
-            <a:noAutofit/>
-          </a:bodyPr>
+          <a:bodyPr rtlCol="0" anchor="ctr"/>
           <a:lstStyle/>
           <a:p>
             <a:pPr algn="ctr"/>
@@ -34236,97 +34642,763 @@
       </p:sp>
       <p:sp>
         <p:nvSpPr>
-          <p:cNvPr id="4" name="Title 1">
+          <p:cNvPr id="3" name="Content Placeholder 2">
             <a:extLst>
               <a:ext uri="{FF2B5EF4-FFF2-40B4-BE49-F238E27FC236}">
-                <a16:creationId xmlns:a16="http://schemas.microsoft.com/office/drawing/2014/main" id="{3361B791-E470-A013-633A-24197C32A429}"/>
+                <a16:creationId xmlns:a16="http://schemas.microsoft.com/office/drawing/2014/main" id="{0083E5FF-3579-B5A1-6D67-1D76C608E65E}"/>
               </a:ext>
             </a:extLst>
           </p:cNvPr>
-          <p:cNvSpPr txBox="1">
-            <a:spLocks/>
+          <p:cNvSpPr>
+            <a:spLocks noGrp="1"/>
           </p:cNvSpPr>
+          <p:nvPr>
+            <p:ph idx="1"/>
+          </p:nvPr>
+        </p:nvSpPr>
+        <p:spPr>
+          <a:xfrm>
+            <a:off x="589903" y="1934511"/>
+            <a:ext cx="5863651" cy="4228897"/>
+          </a:xfrm>
+        </p:spPr>
+        <p:txBody>
+          <a:bodyPr>
+            <a:noAutofit/>
+          </a:bodyPr>
+          <a:lstStyle/>
+          <a:p>
+            <a:pPr marL="342900" indent="-342900">
+              <a:buAutoNum type="arabicPeriod"/>
+            </a:pPr>
+            <a:r>
+              <a:rPr lang="en-US" sz="1600" dirty="0">
+                <a:latin typeface="+mj-lt"/>
+              </a:rPr>
+              <a:t>Create </a:t>
+            </a:r>
+            <a:r>
+              <a:rPr lang="en-US" sz="1600" dirty="0" err="1">
+                <a:latin typeface="+mj-lt"/>
+              </a:rPr>
+              <a:t>Pactflow</a:t>
+            </a:r>
+            <a:r>
+              <a:rPr lang="en-US" sz="1600" dirty="0">
+                <a:latin typeface="+mj-lt"/>
+              </a:rPr>
+              <a:t> account – </a:t>
+            </a:r>
+            <a:r>
+              <a:rPr lang="en-US" sz="1600" dirty="0">
+                <a:latin typeface="+mj-lt"/>
+                <a:hlinkClick r:id="rId2"/>
+              </a:rPr>
+              <a:t>https://pactflow.io/</a:t>
+            </a:r>
+            <a:endParaRPr lang="en-US" sz="1600" dirty="0">
+              <a:latin typeface="+mj-lt"/>
+            </a:endParaRPr>
+          </a:p>
+          <a:p>
+            <a:pPr marL="342900" indent="-342900">
+              <a:buAutoNum type="arabicPeriod"/>
+            </a:pPr>
+            <a:r>
+              <a:rPr lang="en-US" sz="1600" dirty="0">
+                <a:latin typeface="+mj-lt"/>
+              </a:rPr>
+              <a:t>Generate </a:t>
+            </a:r>
+            <a:r>
+              <a:rPr lang="en-US" sz="1600" dirty="0" err="1">
+                <a:latin typeface="+mj-lt"/>
+              </a:rPr>
+              <a:t>Pactflow</a:t>
+            </a:r>
+            <a:r>
+              <a:rPr lang="en-US" sz="1600" dirty="0">
+                <a:latin typeface="+mj-lt"/>
+              </a:rPr>
+              <a:t> API token.</a:t>
+            </a:r>
+          </a:p>
+          <a:p>
+            <a:pPr marL="342900" indent="-342900">
+              <a:buAutoNum type="arabicPeriod"/>
+            </a:pPr>
+            <a:r>
+              <a:rPr lang="en-US" sz="1600" dirty="0">
+                <a:latin typeface="+mj-lt"/>
+              </a:rPr>
+              <a:t>Publish consumer contract to </a:t>
+            </a:r>
+            <a:r>
+              <a:rPr lang="en-US" sz="1600" dirty="0" err="1">
+                <a:latin typeface="+mj-lt"/>
+              </a:rPr>
+              <a:t>pactflow</a:t>
+            </a:r>
+            <a:r>
+              <a:rPr lang="en-US" sz="1600" dirty="0">
+                <a:latin typeface="+mj-lt"/>
+              </a:rPr>
+              <a:t> using maven plugin.</a:t>
+            </a:r>
+          </a:p>
+          <a:p>
+            <a:pPr marL="457200" lvl="1" indent="0">
+              <a:buNone/>
+            </a:pPr>
+            <a:r>
+              <a:rPr lang="en-US" sz="1600" b="1" i="0" dirty="0" err="1">
+                <a:solidFill>
+                  <a:srgbClr val="172B4D"/>
+                </a:solidFill>
+                <a:effectLst/>
+                <a:latin typeface="+mj-lt"/>
+              </a:rPr>
+              <a:t>mvn</a:t>
+            </a:r>
+            <a:r>
+              <a:rPr lang="en-US" sz="1600" b="1" i="0" dirty="0">
+                <a:solidFill>
+                  <a:srgbClr val="172B4D"/>
+                </a:solidFill>
+                <a:effectLst/>
+                <a:latin typeface="+mj-lt"/>
+              </a:rPr>
+              <a:t> </a:t>
+            </a:r>
+            <a:r>
+              <a:rPr lang="en-US" sz="1600" b="1" i="0" dirty="0" err="1">
+                <a:solidFill>
+                  <a:srgbClr val="172B4D"/>
+                </a:solidFill>
+                <a:effectLst/>
+                <a:latin typeface="+mj-lt"/>
+              </a:rPr>
+              <a:t>pact:publish</a:t>
+            </a:r>
+            <a:endParaRPr lang="en-US" sz="1600" b="1" dirty="0">
+              <a:solidFill>
+                <a:srgbClr val="172B4D"/>
+              </a:solidFill>
+              <a:latin typeface="+mj-lt"/>
+            </a:endParaRPr>
+          </a:p>
+          <a:p>
+            <a:pPr marL="342900" indent="-342900">
+              <a:buFont typeface="+mj-lt"/>
+              <a:buAutoNum type="arabicPeriod"/>
+            </a:pPr>
+            <a:r>
+              <a:rPr lang="en-US" sz="1600" dirty="0">
+                <a:latin typeface="+mj-lt"/>
+              </a:rPr>
+              <a:t>Configure Provider test class: </a:t>
+            </a:r>
+            <a:r>
+              <a:rPr lang="en-US" sz="1600" dirty="0" err="1">
+                <a:latin typeface="+mj-lt"/>
+              </a:rPr>
+              <a:t>PactFlow</a:t>
+            </a:r>
+            <a:r>
+              <a:rPr lang="en-US" sz="1600" dirty="0">
+                <a:latin typeface="+mj-lt"/>
+              </a:rPr>
+              <a:t> URL &amp; Token</a:t>
+            </a:r>
+          </a:p>
+          <a:p>
+            <a:pPr marL="457200" lvl="1" indent="0">
+              <a:buNone/>
+            </a:pPr>
+            <a:r>
+              <a:rPr lang="en-US" sz="1200" b="1" i="0" dirty="0">
+                <a:solidFill>
+                  <a:srgbClr val="172B4D"/>
+                </a:solidFill>
+                <a:effectLst/>
+                <a:latin typeface="+mj-lt"/>
+              </a:rPr>
+              <a:t>@PactBroker( </a:t>
+            </a:r>
+          </a:p>
+          <a:p>
+            <a:pPr marL="457200" lvl="1" indent="0">
+              <a:buNone/>
+            </a:pPr>
+            <a:r>
+              <a:rPr lang="en-US" sz="1200" b="1" i="0" dirty="0" err="1">
+                <a:solidFill>
+                  <a:srgbClr val="172B4D"/>
+                </a:solidFill>
+                <a:effectLst/>
+                <a:latin typeface="+mj-lt"/>
+              </a:rPr>
+              <a:t>url</a:t>
+            </a:r>
+            <a:r>
+              <a:rPr lang="en-US" sz="1200" b="1" i="0" dirty="0">
+                <a:solidFill>
+                  <a:srgbClr val="172B4D"/>
+                </a:solidFill>
+                <a:effectLst/>
+                <a:latin typeface="+mj-lt"/>
+              </a:rPr>
+              <a:t>=</a:t>
+            </a:r>
+            <a:r>
+              <a:rPr lang="en-US" sz="1200" b="1" i="0" dirty="0">
+                <a:effectLst/>
+                <a:latin typeface="+mj-lt"/>
+              </a:rPr>
+              <a:t>"https://example.pactflow.io/"</a:t>
+            </a:r>
+            <a:r>
+              <a:rPr lang="en-US" sz="1200" b="1" i="0" dirty="0">
+                <a:solidFill>
+                  <a:srgbClr val="172B4D"/>
+                </a:solidFill>
+                <a:effectLst/>
+                <a:latin typeface="+mj-lt"/>
+              </a:rPr>
+              <a:t>, </a:t>
+            </a:r>
+          </a:p>
+          <a:p>
+            <a:pPr marL="457200" lvl="1" indent="0">
+              <a:buNone/>
+            </a:pPr>
+            <a:r>
+              <a:rPr lang="en-US" sz="1200" b="1" i="0" dirty="0">
+                <a:solidFill>
+                  <a:srgbClr val="172B4D"/>
+                </a:solidFill>
+                <a:effectLst/>
+                <a:latin typeface="+mj-lt"/>
+              </a:rPr>
+              <a:t>authentication= @PactBrokerAuth(token=</a:t>
+            </a:r>
+            <a:r>
+              <a:rPr lang="en-US" sz="1200" b="1" i="0" dirty="0">
+                <a:effectLst/>
+                <a:latin typeface="+mj-lt"/>
+              </a:rPr>
+              <a:t>“PACTFLOW-API-TOKEN"</a:t>
+            </a:r>
+            <a:r>
+              <a:rPr lang="en-US" sz="1200" b="1" i="0" dirty="0">
+                <a:solidFill>
+                  <a:srgbClr val="172B4D"/>
+                </a:solidFill>
+                <a:effectLst/>
+                <a:latin typeface="+mj-lt"/>
+              </a:rPr>
+              <a:t>)</a:t>
+            </a:r>
+          </a:p>
+          <a:p>
+            <a:pPr marL="457200" lvl="1" indent="0">
+              <a:buNone/>
+            </a:pPr>
+            <a:r>
+              <a:rPr lang="en-US" sz="1200" b="1" i="0" dirty="0">
+                <a:solidFill>
+                  <a:srgbClr val="172B4D"/>
+                </a:solidFill>
+                <a:effectLst/>
+                <a:latin typeface="+mj-lt"/>
+              </a:rPr>
+              <a:t> )</a:t>
+            </a:r>
+            <a:endParaRPr lang="en-US" sz="1200" b="1" dirty="0">
+              <a:latin typeface="+mj-lt"/>
+            </a:endParaRPr>
+          </a:p>
+          <a:p>
+            <a:pPr marL="342900" indent="-342900">
+              <a:buAutoNum type="arabicPeriod"/>
+            </a:pPr>
+            <a:r>
+              <a:rPr lang="en-US" sz="1600" dirty="0">
+                <a:latin typeface="+mj-lt"/>
+              </a:rPr>
+              <a:t>Contract verification by provider locally</a:t>
+            </a:r>
+          </a:p>
+          <a:p>
+            <a:pPr marL="457200" lvl="1" indent="0">
+              <a:buNone/>
+            </a:pPr>
+            <a:r>
+              <a:rPr lang="en-US" sz="1600" b="1" i="0" dirty="0" err="1">
+                <a:solidFill>
+                  <a:srgbClr val="172B4D"/>
+                </a:solidFill>
+                <a:effectLst/>
+                <a:latin typeface="+mj-lt"/>
+              </a:rPr>
+              <a:t>mvn</a:t>
+            </a:r>
+            <a:r>
+              <a:rPr lang="en-US" sz="1600" b="1" i="0" dirty="0">
+                <a:solidFill>
+                  <a:srgbClr val="172B4D"/>
+                </a:solidFill>
+                <a:effectLst/>
+                <a:latin typeface="+mj-lt"/>
+              </a:rPr>
+              <a:t> verify</a:t>
+            </a:r>
+            <a:endParaRPr lang="en-US" sz="1600" b="1" dirty="0">
+              <a:latin typeface="+mj-lt"/>
+            </a:endParaRPr>
+          </a:p>
+          <a:p>
+            <a:pPr marL="342900" indent="-342900">
+              <a:buAutoNum type="arabicPeriod"/>
+            </a:pPr>
+            <a:r>
+              <a:rPr lang="en-US" sz="1600" dirty="0">
+                <a:latin typeface="+mj-lt"/>
+              </a:rPr>
+              <a:t>Publish contract verification result</a:t>
+            </a:r>
+          </a:p>
+          <a:p>
+            <a:pPr marL="0" indent="0">
+              <a:buNone/>
+            </a:pPr>
+            <a:r>
+              <a:rPr lang="en-US" sz="1200" b="1" i="0" dirty="0" err="1">
+                <a:solidFill>
+                  <a:srgbClr val="172B4D"/>
+                </a:solidFill>
+                <a:effectLst/>
+                <a:latin typeface="SFMono-Medium"/>
+              </a:rPr>
+              <a:t>mvn</a:t>
+            </a:r>
+            <a:r>
+              <a:rPr lang="en-US" sz="1200" b="1" i="0" dirty="0">
+                <a:solidFill>
+                  <a:srgbClr val="172B4D"/>
+                </a:solidFill>
+                <a:effectLst/>
+                <a:latin typeface="SFMono-Medium"/>
+              </a:rPr>
+              <a:t> verify -</a:t>
+            </a:r>
+            <a:r>
+              <a:rPr lang="en-US" sz="1200" b="1" i="0" dirty="0" err="1">
+                <a:solidFill>
+                  <a:srgbClr val="172B4D"/>
+                </a:solidFill>
+                <a:effectLst/>
+                <a:latin typeface="SFMono-Medium"/>
+              </a:rPr>
+              <a:t>Dpact.verifier.publishResults</a:t>
+            </a:r>
+            <a:r>
+              <a:rPr lang="en-US" sz="1200" b="1" i="0" dirty="0">
+                <a:solidFill>
+                  <a:srgbClr val="172B4D"/>
+                </a:solidFill>
+                <a:effectLst/>
+                <a:latin typeface="SFMono-Medium"/>
+              </a:rPr>
+              <a:t>=true -</a:t>
+            </a:r>
+            <a:r>
+              <a:rPr lang="en-US" sz="1200" b="1" i="0" dirty="0" err="1">
+                <a:solidFill>
+                  <a:srgbClr val="172B4D"/>
+                </a:solidFill>
+                <a:effectLst/>
+                <a:latin typeface="SFMono-Medium"/>
+              </a:rPr>
+              <a:t>Dpact.provider.version</a:t>
+            </a:r>
+            <a:r>
+              <a:rPr lang="en-US" sz="1200" b="1" i="0" dirty="0">
+                <a:solidFill>
+                  <a:srgbClr val="172B4D"/>
+                </a:solidFill>
+                <a:effectLst/>
+                <a:latin typeface="SFMono-Medium"/>
+              </a:rPr>
+              <a:t>=</a:t>
+            </a:r>
+            <a:r>
+              <a:rPr lang="en-US" sz="1200" b="1" i="0" dirty="0">
+                <a:effectLst/>
+                <a:latin typeface="SFMono-Medium"/>
+              </a:rPr>
+              <a:t>0.0</a:t>
+            </a:r>
+            <a:r>
+              <a:rPr lang="en-US" sz="1200" b="1" i="0" dirty="0">
+                <a:solidFill>
+                  <a:srgbClr val="172B4D"/>
+                </a:solidFill>
+                <a:effectLst/>
+                <a:latin typeface="SFMono-Medium"/>
+              </a:rPr>
+              <a:t>.1-SNAPSHOT</a:t>
+            </a:r>
+            <a:endParaRPr lang="en-US" sz="1800" b="1" dirty="0">
+              <a:latin typeface="+mj-lt"/>
+            </a:endParaRPr>
+          </a:p>
+        </p:txBody>
+      </p:sp>
+      <p:sp>
+        <p:nvSpPr>
+          <p:cNvPr id="5" name="TextBox 4">
+            <a:extLst>
+              <a:ext uri="{FF2B5EF4-FFF2-40B4-BE49-F238E27FC236}">
+                <a16:creationId xmlns:a16="http://schemas.microsoft.com/office/drawing/2014/main" id="{E5D3573E-AB57-F4E9-5BC5-10171E379A9A}"/>
+              </a:ext>
+            </a:extLst>
+          </p:cNvPr>
+          <p:cNvSpPr txBox="1"/>
           <p:nvPr/>
         </p:nvSpPr>
         <p:spPr>
           <a:xfrm>
-            <a:off x="2555631" y="1441938"/>
-            <a:ext cx="7080738" cy="3974124"/>
+            <a:off x="5969978" y="1929538"/>
+            <a:ext cx="5632120" cy="3108543"/>
           </a:xfrm>
           <a:prstGeom prst="rect">
             <a:avLst/>
           </a:prstGeom>
+          <a:noFill/>
         </p:spPr>
         <p:txBody>
-          <a:bodyPr vert="horz" lIns="91440" tIns="45720" rIns="91440" bIns="45720" rtlCol="0" anchor="ctr">
-            <a:normAutofit/>
+          <a:bodyPr wrap="square" rtlCol="0">
+            <a:spAutoFit/>
           </a:bodyPr>
-          <a:lstStyle>
-            <a:lvl1pPr algn="l" defTabSz="914400" rtl="0" eaLnBrk="1" latinLnBrk="0" hangingPunct="1">
-              <a:lnSpc>
-                <a:spcPct val="90000"/>
-              </a:lnSpc>
-              <a:spcBef>
-                <a:spcPct val="0"/>
-              </a:spcBef>
+          <a:lstStyle/>
+          <a:p>
+            <a:pPr marL="457200" lvl="1" indent="0">
               <a:buNone/>
-              <a:defRPr sz="4400" kern="1200">
-                <a:solidFill>
-                  <a:schemeClr val="tx1"/>
-                </a:solidFill>
+            </a:pPr>
+            <a:r>
+              <a:rPr lang="en-US" sz="1400" dirty="0">
                 <a:latin typeface="+mj-lt"/>
-                <a:ea typeface="+mj-ea"/>
-                <a:cs typeface="+mj-cs"/>
-              </a:defRPr>
-            </a:lvl1pPr>
-          </a:lstStyle>
-          <a:p>
-            <a:pPr algn="ctr">
-              <a:spcAft>
-                <a:spcPts val="600"/>
-              </a:spcAft>
+              </a:rPr>
+              <a:t>&lt;build&gt;</a:t>
+            </a:r>
+          </a:p>
+          <a:p>
+            <a:pPr marL="457200" lvl="1" indent="0">
+              <a:buNone/>
             </a:pPr>
             <a:r>
-              <a:rPr lang="en-US" sz="5400" b="1" dirty="0">
-                <a:solidFill>
-                  <a:schemeClr val="bg1">
-                    <a:lumMod val="95000"/>
-                    <a:lumOff val="5000"/>
-                  </a:schemeClr>
-                </a:solidFill>
-              </a:rPr>
-              <a:t>SESSION 6</a:t>
-            </a:r>
-          </a:p>
-          <a:p>
-            <a:pPr algn="ctr">
-              <a:spcAft>
-                <a:spcPts val="600"/>
-              </a:spcAft>
+              <a:rPr lang="en-US" sz="1400" dirty="0">
+                <a:latin typeface="+mj-lt"/>
+              </a:rPr>
+              <a:t>  &lt;plugins&gt;</a:t>
+            </a:r>
+          </a:p>
+          <a:p>
+            <a:pPr marL="457200" lvl="1" indent="0">
+              <a:buNone/>
             </a:pPr>
             <a:r>
-              <a:rPr lang="en-US" sz="5400" dirty="0">
-                <a:solidFill>
-                  <a:schemeClr val="bg1">
-                    <a:lumMod val="95000"/>
-                    <a:lumOff val="5000"/>
-                  </a:schemeClr>
-                </a:solidFill>
-              </a:rPr>
-              <a:t>Q&amp;A and Doubt resolution on practice task</a:t>
-            </a:r>
+              <a:rPr lang="en-US" sz="1400" dirty="0">
+                <a:latin typeface="+mj-lt"/>
+              </a:rPr>
+              <a:t>      ...</a:t>
+            </a:r>
+          </a:p>
+          <a:p>
+            <a:pPr marL="457200" lvl="1" indent="0">
+              <a:buNone/>
+            </a:pPr>
+            <a:r>
+              <a:rPr lang="en-US" sz="1400" dirty="0">
+                <a:latin typeface="+mj-lt"/>
+              </a:rPr>
+              <a:t>      &lt;plugin&gt;</a:t>
+            </a:r>
+          </a:p>
+          <a:p>
+            <a:pPr marL="457200" lvl="1" indent="0">
+              <a:buNone/>
+            </a:pPr>
+            <a:r>
+              <a:rPr lang="en-US" sz="1400" dirty="0">
+                <a:latin typeface="+mj-lt"/>
+              </a:rPr>
+              <a:t>          &lt;</a:t>
+            </a:r>
+            <a:r>
+              <a:rPr lang="en-US" sz="1400" dirty="0" err="1">
+                <a:latin typeface="+mj-lt"/>
+              </a:rPr>
+              <a:t>groupId</a:t>
+            </a:r>
+            <a:r>
+              <a:rPr lang="en-US" sz="1400" dirty="0">
+                <a:latin typeface="+mj-lt"/>
+              </a:rPr>
+              <a:t>&gt;</a:t>
+            </a:r>
+            <a:r>
+              <a:rPr lang="en-US" sz="1400" b="1" dirty="0" err="1">
+                <a:latin typeface="+mj-lt"/>
+              </a:rPr>
+              <a:t>au.com.dius.pact.provider</a:t>
+            </a:r>
+            <a:r>
+              <a:rPr lang="en-US" sz="1400" dirty="0">
+                <a:latin typeface="+mj-lt"/>
+              </a:rPr>
+              <a:t>&lt;/</a:t>
+            </a:r>
+            <a:r>
+              <a:rPr lang="en-US" sz="1400" dirty="0" err="1">
+                <a:latin typeface="+mj-lt"/>
+              </a:rPr>
+              <a:t>groupId</a:t>
+            </a:r>
+            <a:r>
+              <a:rPr lang="en-US" sz="1400" dirty="0">
+                <a:latin typeface="+mj-lt"/>
+              </a:rPr>
+              <a:t>&gt;</a:t>
+            </a:r>
+          </a:p>
+          <a:p>
+            <a:pPr marL="457200" lvl="1" indent="0">
+              <a:buNone/>
+            </a:pPr>
+            <a:r>
+              <a:rPr lang="en-US" sz="1400" dirty="0">
+                <a:latin typeface="+mj-lt"/>
+              </a:rPr>
+              <a:t>          &lt;</a:t>
+            </a:r>
+            <a:r>
+              <a:rPr lang="en-US" sz="1400" dirty="0" err="1">
+                <a:latin typeface="+mj-lt"/>
+              </a:rPr>
+              <a:t>artifactId</a:t>
+            </a:r>
+            <a:r>
+              <a:rPr lang="en-US" sz="1400" dirty="0">
+                <a:latin typeface="+mj-lt"/>
+              </a:rPr>
+              <a:t>&gt;</a:t>
+            </a:r>
+            <a:r>
+              <a:rPr lang="en-US" sz="1400" b="1" dirty="0">
+                <a:latin typeface="+mj-lt"/>
+              </a:rPr>
+              <a:t>maven</a:t>
+            </a:r>
+            <a:r>
+              <a:rPr lang="en-US" sz="1400" dirty="0">
+                <a:latin typeface="+mj-lt"/>
+              </a:rPr>
+              <a:t>&lt;/</a:t>
+            </a:r>
+            <a:r>
+              <a:rPr lang="en-US" sz="1400" dirty="0" err="1">
+                <a:latin typeface="+mj-lt"/>
+              </a:rPr>
+              <a:t>artifactId</a:t>
+            </a:r>
+            <a:r>
+              <a:rPr lang="en-US" sz="1400" dirty="0">
+                <a:latin typeface="+mj-lt"/>
+              </a:rPr>
+              <a:t>&gt;</a:t>
+            </a:r>
+          </a:p>
+          <a:p>
+            <a:pPr marL="457200" lvl="1" indent="0">
+              <a:buNone/>
+            </a:pPr>
+            <a:r>
+              <a:rPr lang="en-US" sz="1400" dirty="0">
+                <a:latin typeface="+mj-lt"/>
+              </a:rPr>
+              <a:t>          &lt;version&gt;</a:t>
+            </a:r>
+            <a:r>
+              <a:rPr lang="en-US" sz="1400" b="1" dirty="0">
+                <a:latin typeface="+mj-lt"/>
+              </a:rPr>
+              <a:t>4.1.17</a:t>
+            </a:r>
+            <a:r>
+              <a:rPr lang="en-US" sz="1400" dirty="0">
+                <a:latin typeface="+mj-lt"/>
+              </a:rPr>
+              <a:t>&lt;/version&gt;</a:t>
+            </a:r>
+          </a:p>
+          <a:p>
+            <a:pPr marL="457200" lvl="1" indent="0">
+              <a:buNone/>
+            </a:pPr>
+            <a:r>
+              <a:rPr lang="en-US" sz="1400" dirty="0">
+                <a:latin typeface="+mj-lt"/>
+              </a:rPr>
+              <a:t>          &lt;configuration&gt;</a:t>
+            </a:r>
+          </a:p>
+          <a:p>
+            <a:pPr marL="457200" lvl="1" indent="0">
+              <a:buNone/>
+            </a:pPr>
+            <a:r>
+              <a:rPr lang="en-US" sz="1400" dirty="0">
+                <a:latin typeface="+mj-lt"/>
+              </a:rPr>
+              <a:t>            &lt;</a:t>
+            </a:r>
+            <a:r>
+              <a:rPr lang="en-US" sz="1400" dirty="0" err="1">
+                <a:latin typeface="+mj-lt"/>
+              </a:rPr>
+              <a:t>pactBrokerUrl</a:t>
+            </a:r>
+            <a:r>
+              <a:rPr lang="en-US" sz="1400" dirty="0">
+                <a:latin typeface="+mj-lt"/>
+              </a:rPr>
+              <a:t>&gt;</a:t>
+            </a:r>
+            <a:r>
+              <a:rPr lang="en-US" sz="1400" b="1" i="0" dirty="0">
+                <a:effectLst/>
+                <a:latin typeface="+mj-lt"/>
+              </a:rPr>
+              <a:t>https://example.pactflow.io/</a:t>
+            </a:r>
+            <a:r>
+              <a:rPr lang="en-US" sz="1400" dirty="0">
+                <a:latin typeface="+mj-lt"/>
+              </a:rPr>
+              <a:t>&lt;/pactBrokerUrl&gt;</a:t>
+            </a:r>
+          </a:p>
+          <a:p>
+            <a:pPr marL="457200" lvl="1" indent="0">
+              <a:buNone/>
+            </a:pPr>
+            <a:r>
+              <a:rPr lang="en-US" sz="1400" dirty="0">
+                <a:latin typeface="+mj-lt"/>
+              </a:rPr>
+              <a:t>            &lt;</a:t>
+            </a:r>
+            <a:r>
+              <a:rPr lang="en-US" sz="1400" dirty="0" err="1">
+                <a:latin typeface="+mj-lt"/>
+              </a:rPr>
+              <a:t>pactBrokerToken</a:t>
+            </a:r>
+            <a:r>
+              <a:rPr lang="en-US" sz="1400" dirty="0">
+                <a:latin typeface="+mj-lt"/>
+              </a:rPr>
+              <a:t>&gt;</a:t>
+            </a:r>
+            <a:r>
+              <a:rPr lang="en-US" sz="1400" b="1" dirty="0">
+                <a:latin typeface="+mj-lt"/>
+              </a:rPr>
+              <a:t>PACTFLOW-API-</a:t>
+            </a:r>
+            <a:r>
+              <a:rPr lang="en-US" sz="1400" b="1" dirty="0" err="1">
+                <a:latin typeface="+mj-lt"/>
+              </a:rPr>
+              <a:t>sTOKEN</a:t>
+            </a:r>
+            <a:r>
+              <a:rPr lang="en-US" sz="1400" dirty="0">
+                <a:latin typeface="+mj-lt"/>
+              </a:rPr>
+              <a:t>&lt;/</a:t>
+            </a:r>
+            <a:r>
+              <a:rPr lang="en-US" sz="1400" dirty="0" err="1">
+                <a:latin typeface="+mj-lt"/>
+              </a:rPr>
+              <a:t>pactBrokerToken</a:t>
+            </a:r>
+            <a:r>
+              <a:rPr lang="en-US" sz="1400" dirty="0">
+                <a:latin typeface="+mj-lt"/>
+              </a:rPr>
+              <a:t>&gt;</a:t>
+            </a:r>
+          </a:p>
+          <a:p>
+            <a:pPr marL="457200" lvl="1" indent="0">
+              <a:buNone/>
+            </a:pPr>
+            <a:r>
+              <a:rPr lang="en-US" sz="1400" dirty="0">
+                <a:latin typeface="+mj-lt"/>
+              </a:rPr>
+              <a:t>          &lt;/configuration&gt;</a:t>
+            </a:r>
+          </a:p>
+          <a:p>
+            <a:pPr marL="457200" lvl="1" indent="0">
+              <a:buNone/>
+            </a:pPr>
+            <a:r>
+              <a:rPr lang="en-US" sz="1400" dirty="0">
+                <a:latin typeface="+mj-lt"/>
+              </a:rPr>
+              <a:t>      &lt;/plugin&gt;</a:t>
+            </a:r>
+          </a:p>
+          <a:p>
+            <a:pPr marL="457200" lvl="1" indent="0">
+              <a:buNone/>
+            </a:pPr>
+            <a:r>
+              <a:rPr lang="en-US" sz="1400" dirty="0">
+                <a:latin typeface="+mj-lt"/>
+              </a:rPr>
+              <a:t>  &lt;/plugins&gt;</a:t>
+            </a:r>
+          </a:p>
+          <a:p>
+            <a:pPr marL="457200" lvl="1" indent="0">
+              <a:buNone/>
+            </a:pPr>
+            <a:r>
+              <a:rPr lang="en-US" sz="1400" dirty="0">
+                <a:latin typeface="+mj-lt"/>
+              </a:rPr>
+              <a:t>&lt;/build&gt;</a:t>
+            </a:r>
+            <a:endParaRPr lang="en-US" sz="1400" dirty="0"/>
           </a:p>
         </p:txBody>
       </p:sp>
     </p:spTree>
     <p:extLst>
       <p:ext uri="{BB962C8B-B14F-4D97-AF65-F5344CB8AC3E}">
-        <p14:creationId xmlns:p14="http://schemas.microsoft.com/office/powerpoint/2010/main" val="850214161"/>
+        <p14:creationId xmlns:p14="http://schemas.microsoft.com/office/powerpoint/2010/main" val="55315490"/>
       </p:ext>
     </p:extLst>
   </p:cSld>
   <p:clrMapOvr>
-    <a:overrideClrMapping bg1="dk1" tx1="lt1" bg2="dk2" tx2="lt2" accent1="accent1" accent2="accent2" accent3="accent3" accent4="accent4" accent5="accent5" accent6="accent6" hlink="hlink" folHlink="folHlink"/>
+    <a:masterClrMapping/>
   </p:clrMapOvr>
 </p:sld>
 </file>
@@ -34916,6 +35988,461 @@
 </file>
 
 <file path=ppt/slides/slide30.xml><?xml version="1.0" encoding="utf-8"?>
+<p:sld xmlns:a="http://schemas.openxmlformats.org/drawingml/2006/main" xmlns:r="http://schemas.openxmlformats.org/officeDocument/2006/relationships" xmlns:p="http://schemas.openxmlformats.org/presentationml/2006/main">
+  <p:cSld>
+    <p:bg>
+      <p:bgPr>
+        <a:solidFill>
+          <a:schemeClr val="bg1">
+            <a:tint val="95000"/>
+            <a:satMod val="170000"/>
+          </a:schemeClr>
+        </a:solidFill>
+        <a:effectLst/>
+      </p:bgPr>
+    </p:bg>
+    <p:spTree>
+      <p:nvGrpSpPr>
+        <p:cNvPr id="1" name=""/>
+        <p:cNvGrpSpPr/>
+        <p:nvPr/>
+      </p:nvGrpSpPr>
+      <p:grpSpPr>
+        <a:xfrm>
+          <a:off x="0" y="0"/>
+          <a:ext cx="0" cy="0"/>
+          <a:chOff x="0" y="0"/>
+          <a:chExt cx="0" cy="0"/>
+        </a:xfrm>
+      </p:grpSpPr>
+      <p:sp>
+        <p:nvSpPr>
+          <p:cNvPr id="9" name="Freeform: Shape 8">
+            <a:extLst>
+              <a:ext uri="{FF2B5EF4-FFF2-40B4-BE49-F238E27FC236}">
+                <a16:creationId xmlns:a16="http://schemas.microsoft.com/office/drawing/2014/main" id="{66B332A4-D438-4773-A77F-5ED49A448D9D}"/>
+              </a:ext>
+              <a:ext uri="{C183D7F6-B498-43B3-948B-1728B52AA6E4}">
+                <adec:decorative xmlns:adec="http://schemas.microsoft.com/office/drawing/2017/decorative" val="1"/>
+              </a:ext>
+            </a:extLst>
+          </p:cNvPr>
+          <p:cNvSpPr>
+            <a:spLocks noGrp="1" noRot="1" noChangeAspect="1" noMove="1" noResize="1" noEditPoints="1" noAdjustHandles="1" noChangeArrowheads="1" noChangeShapeType="1" noTextEdit="1"/>
+          </p:cNvSpPr>
+          <p:nvPr>
+            <p:extLst>
+              <p:ext uri="{386F3935-93C4-4BCD-93E2-E3B085C9AB24}">
+                <p16:designElem xmlns:p16="http://schemas.microsoft.com/office/powerpoint/2015/main" val="1"/>
+              </p:ext>
+            </p:extLst>
+          </p:nvPr>
+        </p:nvSpPr>
+        <p:spPr>
+          <a:xfrm>
+            <a:off x="1953768" y="0"/>
+            <a:ext cx="8284464" cy="6858000"/>
+          </a:xfrm>
+          <a:custGeom>
+            <a:avLst/>
+            <a:gdLst>
+              <a:gd name="connsiteX0" fmla="*/ 1818109 w 8284464"/>
+              <a:gd name="connsiteY0" fmla="*/ 0 h 6858000"/>
+              <a:gd name="connsiteX1" fmla="*/ 6466355 w 8284464"/>
+              <a:gd name="connsiteY1" fmla="*/ 0 h 6858000"/>
+              <a:gd name="connsiteX2" fmla="*/ 6620596 w 8284464"/>
+              <a:gd name="connsiteY2" fmla="*/ 109683 h 6858000"/>
+              <a:gd name="connsiteX3" fmla="*/ 8284464 w 8284464"/>
+              <a:gd name="connsiteY3" fmla="*/ 3429000 h 6858000"/>
+              <a:gd name="connsiteX4" fmla="*/ 6620596 w 8284464"/>
+              <a:gd name="connsiteY4" fmla="*/ 6748318 h 6858000"/>
+              <a:gd name="connsiteX5" fmla="*/ 6466355 w 8284464"/>
+              <a:gd name="connsiteY5" fmla="*/ 6858000 h 6858000"/>
+              <a:gd name="connsiteX6" fmla="*/ 1818109 w 8284464"/>
+              <a:gd name="connsiteY6" fmla="*/ 6858000 h 6858000"/>
+              <a:gd name="connsiteX7" fmla="*/ 1663869 w 8284464"/>
+              <a:gd name="connsiteY7" fmla="*/ 6748318 h 6858000"/>
+              <a:gd name="connsiteX8" fmla="*/ 0 w 8284464"/>
+              <a:gd name="connsiteY8" fmla="*/ 3429000 h 6858000"/>
+              <a:gd name="connsiteX9" fmla="*/ 1663869 w 8284464"/>
+              <a:gd name="connsiteY9" fmla="*/ 109683 h 6858000"/>
+            </a:gdLst>
+            <a:ahLst/>
+            <a:cxnLst>
+              <a:cxn ang="0">
+                <a:pos x="connsiteX0" y="connsiteY0"/>
+              </a:cxn>
+              <a:cxn ang="0">
+                <a:pos x="connsiteX1" y="connsiteY1"/>
+              </a:cxn>
+              <a:cxn ang="0">
+                <a:pos x="connsiteX2" y="connsiteY2"/>
+              </a:cxn>
+              <a:cxn ang="0">
+                <a:pos x="connsiteX3" y="connsiteY3"/>
+              </a:cxn>
+              <a:cxn ang="0">
+                <a:pos x="connsiteX4" y="connsiteY4"/>
+              </a:cxn>
+              <a:cxn ang="0">
+                <a:pos x="connsiteX5" y="connsiteY5"/>
+              </a:cxn>
+              <a:cxn ang="0">
+                <a:pos x="connsiteX6" y="connsiteY6"/>
+              </a:cxn>
+              <a:cxn ang="0">
+                <a:pos x="connsiteX7" y="connsiteY7"/>
+              </a:cxn>
+              <a:cxn ang="0">
+                <a:pos x="connsiteX8" y="connsiteY8"/>
+              </a:cxn>
+              <a:cxn ang="0">
+                <a:pos x="connsiteX9" y="connsiteY9"/>
+              </a:cxn>
+            </a:cxnLst>
+            <a:rect l="l" t="t" r="r" b="b"/>
+            <a:pathLst>
+              <a:path w="8284464" h="6858000">
+                <a:moveTo>
+                  <a:pt x="1818109" y="0"/>
+                </a:moveTo>
+                <a:lnTo>
+                  <a:pt x="6466355" y="0"/>
+                </a:lnTo>
+                <a:lnTo>
+                  <a:pt x="6620596" y="109683"/>
+                </a:lnTo>
+                <a:cubicBezTo>
+                  <a:pt x="7630666" y="865069"/>
+                  <a:pt x="8284464" y="2070683"/>
+                  <a:pt x="8284464" y="3429000"/>
+                </a:cubicBezTo>
+                <a:cubicBezTo>
+                  <a:pt x="8284464" y="4787317"/>
+                  <a:pt x="7630666" y="5992931"/>
+                  <a:pt x="6620596" y="6748318"/>
+                </a:cubicBezTo>
+                <a:lnTo>
+                  <a:pt x="6466355" y="6858000"/>
+                </a:lnTo>
+                <a:lnTo>
+                  <a:pt x="1818109" y="6858000"/>
+                </a:lnTo>
+                <a:lnTo>
+                  <a:pt x="1663869" y="6748318"/>
+                </a:lnTo>
+                <a:cubicBezTo>
+                  <a:pt x="653798" y="5992931"/>
+                  <a:pt x="0" y="4787317"/>
+                  <a:pt x="0" y="3429000"/>
+                </a:cubicBezTo>
+                <a:cubicBezTo>
+                  <a:pt x="0" y="2070683"/>
+                  <a:pt x="653798" y="865069"/>
+                  <a:pt x="1663869" y="109683"/>
+                </a:cubicBezTo>
+                <a:close/>
+              </a:path>
+            </a:pathLst>
+          </a:custGeom>
+          <a:solidFill>
+            <a:srgbClr val="FFFFFF">
+              <a:alpha val="80000"/>
+            </a:srgbClr>
+          </a:solidFill>
+          <a:ln>
+            <a:noFill/>
+          </a:ln>
+        </p:spPr>
+        <p:style>
+          <a:lnRef idx="2">
+            <a:schemeClr val="accent1">
+              <a:shade val="50000"/>
+            </a:schemeClr>
+          </a:lnRef>
+          <a:fillRef idx="1">
+            <a:schemeClr val="accent1"/>
+          </a:fillRef>
+          <a:effectRef idx="0">
+            <a:schemeClr val="accent1"/>
+          </a:effectRef>
+          <a:fontRef idx="minor">
+            <a:schemeClr val="lt1"/>
+          </a:fontRef>
+        </p:style>
+        <p:txBody>
+          <a:bodyPr wrap="square" rtlCol="0" anchor="ctr">
+            <a:noAutofit/>
+          </a:bodyPr>
+          <a:lstStyle/>
+          <a:p>
+            <a:pPr algn="ctr"/>
+            <a:endParaRPr lang="en-US"/>
+          </a:p>
+        </p:txBody>
+      </p:sp>
+      <p:sp>
+        <p:nvSpPr>
+          <p:cNvPr id="11" name="Freeform: Shape 10">
+            <a:extLst>
+              <a:ext uri="{FF2B5EF4-FFF2-40B4-BE49-F238E27FC236}">
+                <a16:creationId xmlns:a16="http://schemas.microsoft.com/office/drawing/2014/main" id="{DF9AD32D-FF05-44F4-BD4D-9CEE89B71EB9}"/>
+              </a:ext>
+              <a:ext uri="{C183D7F6-B498-43B3-948B-1728B52AA6E4}">
+                <adec:decorative xmlns:adec="http://schemas.microsoft.com/office/drawing/2017/decorative" val="1"/>
+              </a:ext>
+            </a:extLst>
+          </p:cNvPr>
+          <p:cNvSpPr>
+            <a:spLocks noGrp="1" noRot="1" noChangeAspect="1" noMove="1" noResize="1" noEditPoints="1" noAdjustHandles="1" noChangeArrowheads="1" noChangeShapeType="1" noTextEdit="1"/>
+          </p:cNvSpPr>
+          <p:nvPr>
+            <p:extLst>
+              <p:ext uri="{386F3935-93C4-4BCD-93E2-E3B085C9AB24}">
+                <p16:designElem xmlns:p16="http://schemas.microsoft.com/office/powerpoint/2015/main" val="1"/>
+              </p:ext>
+            </p:extLst>
+          </p:nvPr>
+        </p:nvSpPr>
+        <p:spPr>
+          <a:xfrm>
+            <a:off x="2118360" y="0"/>
+            <a:ext cx="7955280" cy="6858000"/>
+          </a:xfrm>
+          <a:custGeom>
+            <a:avLst/>
+            <a:gdLst>
+              <a:gd name="connsiteX0" fmla="*/ 1962423 w 7955280"/>
+              <a:gd name="connsiteY0" fmla="*/ 0 h 6858000"/>
+              <a:gd name="connsiteX1" fmla="*/ 5992858 w 7955280"/>
+              <a:gd name="connsiteY1" fmla="*/ 0 h 6858000"/>
+              <a:gd name="connsiteX2" fmla="*/ 6040191 w 7955280"/>
+              <a:gd name="connsiteY2" fmla="*/ 27216 h 6858000"/>
+              <a:gd name="connsiteX3" fmla="*/ 7955280 w 7955280"/>
+              <a:gd name="connsiteY3" fmla="*/ 3429000 h 6858000"/>
+              <a:gd name="connsiteX4" fmla="*/ 6040191 w 7955280"/>
+              <a:gd name="connsiteY4" fmla="*/ 6830784 h 6858000"/>
+              <a:gd name="connsiteX5" fmla="*/ 5992858 w 7955280"/>
+              <a:gd name="connsiteY5" fmla="*/ 6858000 h 6858000"/>
+              <a:gd name="connsiteX6" fmla="*/ 1962423 w 7955280"/>
+              <a:gd name="connsiteY6" fmla="*/ 6858000 h 6858000"/>
+              <a:gd name="connsiteX7" fmla="*/ 1915089 w 7955280"/>
+              <a:gd name="connsiteY7" fmla="*/ 6830784 h 6858000"/>
+              <a:gd name="connsiteX8" fmla="*/ 0 w 7955280"/>
+              <a:gd name="connsiteY8" fmla="*/ 3429000 h 6858000"/>
+              <a:gd name="connsiteX9" fmla="*/ 1915089 w 7955280"/>
+              <a:gd name="connsiteY9" fmla="*/ 27216 h 6858000"/>
+            </a:gdLst>
+            <a:ahLst/>
+            <a:cxnLst>
+              <a:cxn ang="0">
+                <a:pos x="connsiteX0" y="connsiteY0"/>
+              </a:cxn>
+              <a:cxn ang="0">
+                <a:pos x="connsiteX1" y="connsiteY1"/>
+              </a:cxn>
+              <a:cxn ang="0">
+                <a:pos x="connsiteX2" y="connsiteY2"/>
+              </a:cxn>
+              <a:cxn ang="0">
+                <a:pos x="connsiteX3" y="connsiteY3"/>
+              </a:cxn>
+              <a:cxn ang="0">
+                <a:pos x="connsiteX4" y="connsiteY4"/>
+              </a:cxn>
+              <a:cxn ang="0">
+                <a:pos x="connsiteX5" y="connsiteY5"/>
+              </a:cxn>
+              <a:cxn ang="0">
+                <a:pos x="connsiteX6" y="connsiteY6"/>
+              </a:cxn>
+              <a:cxn ang="0">
+                <a:pos x="connsiteX7" y="connsiteY7"/>
+              </a:cxn>
+              <a:cxn ang="0">
+                <a:pos x="connsiteX8" y="connsiteY8"/>
+              </a:cxn>
+              <a:cxn ang="0">
+                <a:pos x="connsiteX9" y="connsiteY9"/>
+              </a:cxn>
+            </a:cxnLst>
+            <a:rect l="l" t="t" r="r" b="b"/>
+            <a:pathLst>
+              <a:path w="7955280" h="6858000">
+                <a:moveTo>
+                  <a:pt x="1962423" y="0"/>
+                </a:moveTo>
+                <a:lnTo>
+                  <a:pt x="5992858" y="0"/>
+                </a:lnTo>
+                <a:lnTo>
+                  <a:pt x="6040191" y="27216"/>
+                </a:lnTo>
+                <a:cubicBezTo>
+                  <a:pt x="7188332" y="724844"/>
+                  <a:pt x="7955280" y="1987357"/>
+                  <a:pt x="7955280" y="3429000"/>
+                </a:cubicBezTo>
+                <a:cubicBezTo>
+                  <a:pt x="7955280" y="4870644"/>
+                  <a:pt x="7188332" y="6133157"/>
+                  <a:pt x="6040191" y="6830784"/>
+                </a:cubicBezTo>
+                <a:lnTo>
+                  <a:pt x="5992858" y="6858000"/>
+                </a:lnTo>
+                <a:lnTo>
+                  <a:pt x="1962423" y="6858000"/>
+                </a:lnTo>
+                <a:lnTo>
+                  <a:pt x="1915089" y="6830784"/>
+                </a:lnTo>
+                <a:cubicBezTo>
+                  <a:pt x="766948" y="6133157"/>
+                  <a:pt x="0" y="4870644"/>
+                  <a:pt x="0" y="3429000"/>
+                </a:cubicBezTo>
+                <a:cubicBezTo>
+                  <a:pt x="0" y="1987357"/>
+                  <a:pt x="766948" y="724844"/>
+                  <a:pt x="1915089" y="27216"/>
+                </a:cubicBezTo>
+                <a:close/>
+              </a:path>
+            </a:pathLst>
+          </a:custGeom>
+          <a:solidFill>
+            <a:schemeClr val="tx1"/>
+          </a:solidFill>
+          <a:ln>
+            <a:noFill/>
+          </a:ln>
+        </p:spPr>
+        <p:style>
+          <a:lnRef idx="2">
+            <a:schemeClr val="accent1">
+              <a:shade val="50000"/>
+            </a:schemeClr>
+          </a:lnRef>
+          <a:fillRef idx="1">
+            <a:schemeClr val="accent1"/>
+          </a:fillRef>
+          <a:effectRef idx="0">
+            <a:schemeClr val="accent1"/>
+          </a:effectRef>
+          <a:fontRef idx="minor">
+            <a:schemeClr val="lt1"/>
+          </a:fontRef>
+        </p:style>
+        <p:txBody>
+          <a:bodyPr wrap="square" rtlCol="0" anchor="ctr">
+            <a:noAutofit/>
+          </a:bodyPr>
+          <a:lstStyle/>
+          <a:p>
+            <a:pPr algn="ctr"/>
+            <a:endParaRPr lang="en-US"/>
+          </a:p>
+        </p:txBody>
+      </p:sp>
+      <p:sp>
+        <p:nvSpPr>
+          <p:cNvPr id="4" name="Title 1">
+            <a:extLst>
+              <a:ext uri="{FF2B5EF4-FFF2-40B4-BE49-F238E27FC236}">
+                <a16:creationId xmlns:a16="http://schemas.microsoft.com/office/drawing/2014/main" id="{3361B791-E470-A013-633A-24197C32A429}"/>
+              </a:ext>
+            </a:extLst>
+          </p:cNvPr>
+          <p:cNvSpPr txBox="1">
+            <a:spLocks/>
+          </p:cNvSpPr>
+          <p:nvPr/>
+        </p:nvSpPr>
+        <p:spPr>
+          <a:xfrm>
+            <a:off x="2555631" y="1441938"/>
+            <a:ext cx="7080738" cy="3974124"/>
+          </a:xfrm>
+          <a:prstGeom prst="rect">
+            <a:avLst/>
+          </a:prstGeom>
+        </p:spPr>
+        <p:txBody>
+          <a:bodyPr vert="horz" lIns="91440" tIns="45720" rIns="91440" bIns="45720" rtlCol="0" anchor="ctr">
+            <a:normAutofit/>
+          </a:bodyPr>
+          <a:lstStyle>
+            <a:lvl1pPr algn="l" defTabSz="914400" rtl="0" eaLnBrk="1" latinLnBrk="0" hangingPunct="1">
+              <a:lnSpc>
+                <a:spcPct val="90000"/>
+              </a:lnSpc>
+              <a:spcBef>
+                <a:spcPct val="0"/>
+              </a:spcBef>
+              <a:buNone/>
+              <a:defRPr sz="4400" kern="1200">
+                <a:solidFill>
+                  <a:schemeClr val="tx1"/>
+                </a:solidFill>
+                <a:latin typeface="+mj-lt"/>
+                <a:ea typeface="+mj-ea"/>
+                <a:cs typeface="+mj-cs"/>
+              </a:defRPr>
+            </a:lvl1pPr>
+          </a:lstStyle>
+          <a:p>
+            <a:pPr algn="ctr">
+              <a:spcAft>
+                <a:spcPts val="600"/>
+              </a:spcAft>
+            </a:pPr>
+            <a:r>
+              <a:rPr lang="en-US" sz="5400" b="1" dirty="0">
+                <a:solidFill>
+                  <a:schemeClr val="bg1">
+                    <a:lumMod val="95000"/>
+                    <a:lumOff val="5000"/>
+                  </a:schemeClr>
+                </a:solidFill>
+              </a:rPr>
+              <a:t>SESSION 6</a:t>
+            </a:r>
+          </a:p>
+          <a:p>
+            <a:pPr algn="ctr">
+              <a:spcAft>
+                <a:spcPts val="600"/>
+              </a:spcAft>
+            </a:pPr>
+            <a:r>
+              <a:rPr lang="en-US" sz="5400" dirty="0">
+                <a:solidFill>
+                  <a:schemeClr val="bg1">
+                    <a:lumMod val="95000"/>
+                    <a:lumOff val="5000"/>
+                  </a:schemeClr>
+                </a:solidFill>
+              </a:rPr>
+              <a:t>Q&amp;A and Doubt resolution on practice task</a:t>
+            </a:r>
+          </a:p>
+        </p:txBody>
+      </p:sp>
+    </p:spTree>
+    <p:extLst>
+      <p:ext uri="{BB962C8B-B14F-4D97-AF65-F5344CB8AC3E}">
+        <p14:creationId xmlns:p14="http://schemas.microsoft.com/office/powerpoint/2010/main" val="850214161"/>
+      </p:ext>
+    </p:extLst>
+  </p:cSld>
+  <p:clrMapOvr>
+    <a:overrideClrMapping bg1="dk1" tx1="lt1" bg2="dk2" tx2="lt2" accent1="accent1" accent2="accent2" accent3="accent3" accent4="accent4" accent5="accent5" accent6="accent6" hlink="hlink" folHlink="folHlink"/>
+  </p:clrMapOvr>
+</p:sld>
+</file>
+
+<file path=ppt/slides/slide31.xml><?xml version="1.0" encoding="utf-8"?>
 <p:sld xmlns:a="http://schemas.openxmlformats.org/drawingml/2006/main" xmlns:r="http://schemas.openxmlformats.org/officeDocument/2006/relationships" xmlns:p="http://schemas.openxmlformats.org/presentationml/2006/main">
   <p:cSld>
     <p:bg>

</xml_diff>